<commit_message>
fixed title added waterfall vs CICD graphic from Ben's whitepaper
</commit_message>
<xml_diff>
--- a/presentations/104 - Intro to CICD/Session_9_Intro_CICD.pptx
+++ b/presentations/104 - Intro to CICD/Session_9_Intro_CICD.pptx
@@ -5,10 +5,10 @@
     <p:sldMasterId id="2147484157" r:id="rId1"/>
   </p:sldMasterIdLst>
   <p:notesMasterIdLst>
-    <p:notesMasterId r:id="rId26"/>
+    <p:notesMasterId r:id="rId27"/>
   </p:notesMasterIdLst>
   <p:handoutMasterIdLst>
-    <p:handoutMasterId r:id="rId27"/>
+    <p:handoutMasterId r:id="rId28"/>
   </p:handoutMasterIdLst>
   <p:sldIdLst>
     <p:sldId id="734" r:id="rId2"/>
@@ -20,21 +20,22 @@
     <p:sldId id="729" r:id="rId8"/>
     <p:sldId id="730" r:id="rId9"/>
     <p:sldId id="731" r:id="rId10"/>
-    <p:sldId id="732" r:id="rId11"/>
-    <p:sldId id="735" r:id="rId12"/>
-    <p:sldId id="736" r:id="rId13"/>
-    <p:sldId id="737" r:id="rId14"/>
-    <p:sldId id="738" r:id="rId15"/>
-    <p:sldId id="739" r:id="rId16"/>
-    <p:sldId id="740" r:id="rId17"/>
-    <p:sldId id="723" r:id="rId18"/>
-    <p:sldId id="717" r:id="rId19"/>
-    <p:sldId id="718" r:id="rId20"/>
-    <p:sldId id="721" r:id="rId21"/>
-    <p:sldId id="719" r:id="rId22"/>
-    <p:sldId id="720" r:id="rId23"/>
-    <p:sldId id="722" r:id="rId24"/>
-    <p:sldId id="724" r:id="rId25"/>
+    <p:sldId id="741" r:id="rId11"/>
+    <p:sldId id="732" r:id="rId12"/>
+    <p:sldId id="735" r:id="rId13"/>
+    <p:sldId id="736" r:id="rId14"/>
+    <p:sldId id="737" r:id="rId15"/>
+    <p:sldId id="738" r:id="rId16"/>
+    <p:sldId id="739" r:id="rId17"/>
+    <p:sldId id="740" r:id="rId18"/>
+    <p:sldId id="723" r:id="rId19"/>
+    <p:sldId id="717" r:id="rId20"/>
+    <p:sldId id="718" r:id="rId21"/>
+    <p:sldId id="721" r:id="rId22"/>
+    <p:sldId id="719" r:id="rId23"/>
+    <p:sldId id="720" r:id="rId24"/>
+    <p:sldId id="722" r:id="rId25"/>
+    <p:sldId id="724" r:id="rId26"/>
   </p:sldIdLst>
   <p:sldSz cx="9144000" cy="5143500" type="screen16x9"/>
   <p:notesSz cx="6858000" cy="9144000"/>
@@ -754,11 +755,11 @@
 </file>
 
 <file path=ppt/notesSlides/notesSlide10.xml><?xml version="1.0" encoding="utf-8"?>
-<p:notes xmlns:a="http://schemas.openxmlformats.org/drawingml/2006/main" xmlns:r="http://schemas.openxmlformats.org/officeDocument/2006/relationships" xmlns:p="http://schemas.openxmlformats.org/presentationml/2006/main">
+<p:notes xmlns:a="http://schemas.openxmlformats.org/drawingml/2006/main" xmlns:r="http://schemas.openxmlformats.org/officeDocument/2006/relationships" xmlns:p="http://schemas.openxmlformats.org/presentationml/2006/main" showMasterSp="0" showMasterPhAnim="0">
   <p:cSld>
     <p:spTree>
       <p:nvGrpSpPr>
-        <p:cNvPr id="1" name=""/>
+        <p:cNvPr id="1" name="Shape 453"/>
         <p:cNvGrpSpPr/>
         <p:nvPr/>
       </p:nvGrpSpPr>
@@ -772,128 +773,121 @@
       </p:grpSpPr>
       <p:sp>
         <p:nvSpPr>
-          <p:cNvPr id="2" name="Slide Image Placeholder 1"/>
+          <p:cNvPr id="454" name="Shape 454"/>
           <p:cNvSpPr>
             <a:spLocks noGrp="1" noRot="1" noChangeAspect="1"/>
           </p:cNvSpPr>
           <p:nvPr>
-            <p:ph type="sldImg"/>
+            <p:ph type="sldImg" idx="2"/>
           </p:nvPr>
         </p:nvSpPr>
-        <p:spPr/>
+        <p:spPr>
+          <a:xfrm>
+            <a:off x="381000" y="685800"/>
+            <a:ext cx="6096000" cy="3429000"/>
+          </a:xfrm>
+          <a:custGeom>
+            <a:avLst/>
+            <a:gdLst/>
+            <a:ahLst/>
+            <a:cxnLst/>
+            <a:rect l="0" t="0" r="0" b="0"/>
+            <a:pathLst>
+              <a:path w="120000" h="120000" extrusionOk="0">
+                <a:moveTo>
+                  <a:pt x="0" y="0"/>
+                </a:moveTo>
+                <a:lnTo>
+                  <a:pt x="120000" y="0"/>
+                </a:lnTo>
+                <a:lnTo>
+                  <a:pt x="120000" y="120000"/>
+                </a:lnTo>
+                <a:lnTo>
+                  <a:pt x="0" y="120000"/>
+                </a:lnTo>
+                <a:close/>
+              </a:path>
+            </a:pathLst>
+          </a:custGeom>
+        </p:spPr>
       </p:sp>
       <p:sp>
         <p:nvSpPr>
-          <p:cNvPr id="3" name="Notes Placeholder 2"/>
-          <p:cNvSpPr>
+          <p:cNvPr id="455" name="Shape 455"/>
+          <p:cNvSpPr txBox="1">
             <a:spLocks noGrp="1"/>
           </p:cNvSpPr>
           <p:nvPr>
             <p:ph type="body" idx="1"/>
           </p:nvPr>
         </p:nvSpPr>
-        <p:spPr/>
+        <p:spPr>
+          <a:xfrm>
+            <a:off x="685800" y="4343400"/>
+            <a:ext cx="5486400" cy="4114800"/>
+          </a:xfrm>
+          <a:prstGeom prst="rect">
+            <a:avLst/>
+          </a:prstGeom>
+        </p:spPr>
         <p:txBody>
-          <a:bodyPr/>
+          <a:bodyPr wrap="square" lIns="91425" tIns="91425" rIns="91425" bIns="91425" anchor="t" anchorCtr="0">
+            <a:noAutofit/>
+          </a:bodyPr>
           <a:lstStyle/>
           <a:p>
-            <a:pPr marL="0" marR="0" lvl="0" indent="0" algn="l" defTabSz="457200" rtl="0" eaLnBrk="1" fontAlgn="auto" latinLnBrk="0" hangingPunct="1">
-              <a:lnSpc>
-                <a:spcPct val="100000"/>
-              </a:lnSpc>
-              <a:spcBef>
-                <a:spcPts val="0"/>
-              </a:spcBef>
-              <a:spcAft>
-                <a:spcPts val="0"/>
-              </a:spcAft>
-              <a:buClrTx/>
-              <a:buSzTx/>
-              <a:buFontTx/>
-              <a:buNone/>
-              <a:tabLst/>
-              <a:defRPr/>
-            </a:pPr>
-            <a:r>
-              <a:rPr lang="en-US" sz="1200" b="0" i="0" u="none" strike="noStrike" cap="none" dirty="0" smtClean="0">
-                <a:solidFill>
-                  <a:schemeClr val="dk1"/>
-                </a:solidFill>
-                <a:latin typeface="+mn-lt"/>
-                <a:ea typeface="Calibri"/>
-                <a:cs typeface="Calibri"/>
-                <a:sym typeface="Calibri"/>
-              </a:rPr>
-              <a:t>http://</a:t>
-            </a:r>
-            <a:r>
-              <a:rPr lang="en-US" sz="1200" b="0" i="0" u="none" strike="noStrike" cap="none" dirty="0" err="1" smtClean="0">
-                <a:solidFill>
-                  <a:schemeClr val="dk1"/>
-                </a:solidFill>
-                <a:latin typeface="+mn-lt"/>
-                <a:ea typeface="Calibri"/>
-                <a:cs typeface="Calibri"/>
-                <a:sym typeface="Calibri"/>
-              </a:rPr>
-              <a:t>concourse.ci</a:t>
-            </a:r>
-            <a:r>
-              <a:rPr lang="en-US" sz="1200" b="0" i="0" u="none" strike="noStrike" cap="none" dirty="0" smtClean="0">
-                <a:solidFill>
-                  <a:schemeClr val="dk1"/>
-                </a:solidFill>
-                <a:latin typeface="+mn-lt"/>
-                <a:ea typeface="Calibri"/>
-                <a:cs typeface="Calibri"/>
-                <a:sym typeface="Calibri"/>
-              </a:rPr>
-              <a:t>/concourse-</a:t>
-            </a:r>
-            <a:r>
-              <a:rPr lang="en-US" sz="1200" b="0" i="0" u="none" strike="noStrike" cap="none" dirty="0" err="1" smtClean="0">
-                <a:solidFill>
-                  <a:schemeClr val="dk1"/>
-                </a:solidFill>
-                <a:latin typeface="+mn-lt"/>
-                <a:ea typeface="Calibri"/>
-                <a:cs typeface="Calibri"/>
-                <a:sym typeface="Calibri"/>
-              </a:rPr>
-              <a:t>vs.html</a:t>
-            </a:r>
-            <a:endParaRPr lang="en-US" sz="1200" b="0" i="0" u="none" strike="noStrike" cap="none" dirty="0" smtClean="0">
-              <a:solidFill>
-                <a:schemeClr val="dk1"/>
-              </a:solidFill>
-              <a:latin typeface="+mn-lt"/>
-              <a:ea typeface="Calibri"/>
-              <a:cs typeface="Calibri"/>
-              <a:sym typeface="Calibri"/>
-            </a:endParaRPr>
-          </a:p>
-          <a:p>
-            <a:endParaRPr lang="en-US" dirty="0"/>
+            <a:pPr lvl="0" rtl="0">
+              <a:spcBef>
+                <a:spcPts val="0"/>
+              </a:spcBef>
+              <a:buNone/>
+            </a:pPr>
+            <a:r>
+              <a:rPr lang="en-US" dirty="0"/>
+              <a:t>Anger Optimized UI - You shouldn’t get angry at your CI because you can’t find the broken build in your pipeline, or click through a lot of menus to get to the logs.  Concourse provides an intuitive view of your pipeline to let you know the current state at a glance.</a:t>
+            </a:r>
           </a:p>
         </p:txBody>
       </p:sp>
       <p:sp>
         <p:nvSpPr>
-          <p:cNvPr id="4" name="Slide Number Placeholder 3"/>
-          <p:cNvSpPr>
+          <p:cNvPr id="456" name="Shape 456"/>
+          <p:cNvSpPr txBox="1">
             <a:spLocks noGrp="1"/>
           </p:cNvSpPr>
           <p:nvPr>
-            <p:ph type="sldNum" sz="quarter" idx="10"/>
+            <p:ph type="sldNum" idx="12"/>
           </p:nvPr>
         </p:nvSpPr>
-        <p:spPr/>
+        <p:spPr>
+          <a:xfrm>
+            <a:off x="3884612" y="8685213"/>
+            <a:ext cx="2971800" cy="457200"/>
+          </a:xfrm>
+          <a:prstGeom prst="rect">
+            <a:avLst/>
+          </a:prstGeom>
+        </p:spPr>
         <p:txBody>
-          <a:bodyPr/>
+          <a:bodyPr wrap="square" lIns="91425" tIns="45700" rIns="91425" bIns="45700" anchor="b" anchorCtr="0">
+            <a:noAutofit/>
+          </a:bodyPr>
           <a:lstStyle/>
           <a:p>
-            <a:fld id="{9BEDBE90-FDBE-A44D-9062-5A5D1585D5B8}" type="slidenum">
-              <a:rPr lang="en-US" smtClean="0"/>
+            <a:pPr lvl="0" rtl="0">
+              <a:spcBef>
+                <a:spcPts val="0"/>
+              </a:spcBef>
+              <a:buClr>
+                <a:srgbClr val="000000"/>
+              </a:buClr>
+              <a:buSzPct val="25000"/>
+              <a:buFont typeface="Arial"/>
+              <a:buNone/>
+            </a:pPr>
+            <a:fld id="{00000000-1234-1234-1234-123412341234}" type="slidenum">
+              <a:rPr lang="en-US"/>
               <a:t>10</a:t>
             </a:fld>
             <a:endParaRPr lang="en-US"/>
@@ -901,11 +895,6 @@
         </p:txBody>
       </p:sp>
     </p:spTree>
-    <p:extLst>
-      <p:ext uri="{BB962C8B-B14F-4D97-AF65-F5344CB8AC3E}">
-        <p14:creationId xmlns:p14="http://schemas.microsoft.com/office/powerpoint/2010/main" val="534104565"/>
-      </p:ext>
-    </p:extLst>
   </p:cSld>
   <p:clrMapOvr>
     <a:masterClrMapping/>
@@ -957,189 +946,83 @@
           <a:bodyPr/>
           <a:lstStyle/>
           <a:p>
-            <a:r>
-              <a:rPr lang="en-US" sz="1200" kern="1200" dirty="0" smtClean="0">
-                <a:solidFill>
-                  <a:schemeClr val="tx1"/>
-                </a:solidFill>
-                <a:effectLst/>
+            <a:pPr marL="0" marR="0" lvl="0" indent="0" algn="l" defTabSz="457200" rtl="0" eaLnBrk="1" fontAlgn="auto" latinLnBrk="0" hangingPunct="1">
+              <a:lnSpc>
+                <a:spcPct val="100000"/>
+              </a:lnSpc>
+              <a:spcBef>
+                <a:spcPts val="0"/>
+              </a:spcBef>
+              <a:spcAft>
+                <a:spcPts val="0"/>
+              </a:spcAft>
+              <a:buClrTx/>
+              <a:buSzTx/>
+              <a:buFontTx/>
+              <a:buNone/>
+              <a:tabLst/>
+              <a:defRPr/>
+            </a:pPr>
+            <a:r>
+              <a:rPr lang="en-US" sz="1200" b="0" i="0" u="none" strike="noStrike" cap="none" dirty="0" smtClean="0">
+                <a:solidFill>
+                  <a:schemeClr val="dk1"/>
+                </a:solidFill>
                 <a:latin typeface="+mn-lt"/>
-                <a:ea typeface="+mn-ea"/>
-                <a:cs typeface="+mn-cs"/>
-              </a:rPr>
-              <a:t>opinionated template of a deployment pipeline</a:t>
-            </a:r>
-          </a:p>
-          <a:p>
-            <a:r>
-              <a:rPr lang="en-US" sz="1200" kern="1200" dirty="0" smtClean="0">
-                <a:solidFill>
-                  <a:schemeClr val="tx1"/>
-                </a:solidFill>
-                <a:effectLst/>
+                <a:ea typeface="Calibri"/>
+                <a:cs typeface="Calibri"/>
+                <a:sym typeface="Calibri"/>
+              </a:rPr>
+              <a:t>http://</a:t>
+            </a:r>
+            <a:r>
+              <a:rPr lang="en-US" sz="1200" b="0" i="0" u="none" strike="noStrike" cap="none" dirty="0" err="1" smtClean="0">
+                <a:solidFill>
+                  <a:schemeClr val="dk1"/>
+                </a:solidFill>
                 <a:latin typeface="+mn-lt"/>
-                <a:ea typeface="+mn-ea"/>
-                <a:cs typeface="+mn-cs"/>
-              </a:rPr>
-              <a:t>based on good practices from different projects </a:t>
-            </a:r>
-          </a:p>
-          <a:p>
-            <a:r>
-              <a:rPr lang="en-US" sz="1200" kern="1200" dirty="0" smtClean="0">
-                <a:solidFill>
-                  <a:schemeClr val="tx1"/>
-                </a:solidFill>
-                <a:effectLst/>
+                <a:ea typeface="Calibri"/>
+                <a:cs typeface="Calibri"/>
+                <a:sym typeface="Calibri"/>
+              </a:rPr>
+              <a:t>concourse.ci</a:t>
+            </a:r>
+            <a:r>
+              <a:rPr lang="en-US" sz="1200" b="0" i="0" u="none" strike="noStrike" cap="none" dirty="0" smtClean="0">
+                <a:solidFill>
+                  <a:schemeClr val="dk1"/>
+                </a:solidFill>
                 <a:latin typeface="+mn-lt"/>
-                <a:ea typeface="+mn-ea"/>
-                <a:cs typeface="+mn-cs"/>
-              </a:rPr>
-              <a:t>we believe in the “Infrastructure as Code” approach </a:t>
-            </a:r>
-          </a:p>
-          <a:p>
-            <a:pPr lvl="1"/>
-            <a:r>
-              <a:rPr lang="en-US" sz="1200" kern="1200" dirty="0" smtClean="0">
-                <a:solidFill>
-                  <a:schemeClr val="tx1"/>
-                </a:solidFill>
-                <a:effectLst/>
+                <a:ea typeface="Calibri"/>
+                <a:cs typeface="Calibri"/>
+                <a:sym typeface="Calibri"/>
+              </a:rPr>
+              <a:t>/concourse-</a:t>
+            </a:r>
+            <a:r>
+              <a:rPr lang="en-US" sz="1200" b="0" i="0" u="none" strike="noStrike" cap="none" dirty="0" err="1" smtClean="0">
+                <a:solidFill>
+                  <a:schemeClr val="dk1"/>
+                </a:solidFill>
                 <a:latin typeface="+mn-lt"/>
-                <a:ea typeface="+mn-ea"/>
-                <a:cs typeface="+mn-cs"/>
-              </a:rPr>
-              <a:t>live documentation of the infrastructure </a:t>
-            </a:r>
-            <a:endParaRPr lang="en-US" sz="1050" kern="1200" dirty="0" smtClean="0">
+                <a:ea typeface="Calibri"/>
+                <a:cs typeface="Calibri"/>
+                <a:sym typeface="Calibri"/>
+              </a:rPr>
+              <a:t>vs.html</a:t>
+            </a:r>
+            <a:endParaRPr lang="en-US" sz="1200" b="0" i="0" u="none" strike="noStrike" cap="none" dirty="0" smtClean="0">
               <a:solidFill>
-                <a:schemeClr val="tx1"/>
+                <a:schemeClr val="dk1"/>
               </a:solidFill>
-              <a:effectLst/>
               <a:latin typeface="+mn-lt"/>
-              <a:ea typeface="+mn-ea"/>
-              <a:cs typeface="+mn-cs"/>
+              <a:ea typeface="Calibri"/>
+              <a:cs typeface="Calibri"/>
+              <a:sym typeface="Calibri"/>
             </a:endParaRPr>
           </a:p>
           <a:p>
-            <a:pPr lvl="1"/>
-            <a:r>
-              <a:rPr lang="en-US" sz="1200" kern="1200" dirty="0" smtClean="0">
-                <a:solidFill>
-                  <a:schemeClr val="tx1"/>
-                </a:solidFill>
-                <a:effectLst/>
-                <a:latin typeface="+mn-lt"/>
-                <a:ea typeface="+mn-ea"/>
-                <a:cs typeface="+mn-cs"/>
-              </a:rPr>
-              <a:t>in case of automation server going down you can recover everything in no </a:t>
-            </a:r>
-            <a:endParaRPr lang="en-US" sz="1050" kern="1200" dirty="0" smtClean="0">
-              <a:solidFill>
-                <a:schemeClr val="tx1"/>
-              </a:solidFill>
-              <a:effectLst/>
-              <a:latin typeface="+mn-lt"/>
-              <a:ea typeface="+mn-ea"/>
-              <a:cs typeface="+mn-cs"/>
-            </a:endParaRPr>
-          </a:p>
-          <a:p>
-            <a:pPr lvl="1"/>
-            <a:r>
-              <a:rPr lang="en-US" sz="1200" kern="1200" dirty="0" smtClean="0">
-                <a:solidFill>
-                  <a:schemeClr val="tx1"/>
-                </a:solidFill>
-                <a:effectLst/>
-                <a:latin typeface="+mn-lt"/>
-                <a:ea typeface="+mn-ea"/>
-                <a:cs typeface="+mn-cs"/>
-              </a:rPr>
-              <a:t>time </a:t>
-            </a:r>
-            <a:endParaRPr lang="en-US" sz="1050" kern="1200" dirty="0" smtClean="0">
-              <a:solidFill>
-                <a:schemeClr val="tx1"/>
-              </a:solidFill>
-              <a:effectLst/>
-              <a:latin typeface="+mn-lt"/>
-              <a:ea typeface="+mn-ea"/>
-              <a:cs typeface="+mn-cs"/>
-            </a:endParaRPr>
-          </a:p>
-          <a:p>
-            <a:pPr lvl="1"/>
-            <a:r>
-              <a:rPr lang="en-US" sz="1200" kern="1200" dirty="0" smtClean="0">
-                <a:solidFill>
-                  <a:schemeClr val="tx1"/>
-                </a:solidFill>
-                <a:effectLst/>
-                <a:latin typeface="+mn-lt"/>
-                <a:ea typeface="+mn-ea"/>
-                <a:cs typeface="+mn-cs"/>
-              </a:rPr>
-              <a:t>the automation server setup should be automated too! </a:t>
-            </a:r>
-            <a:endParaRPr lang="en-US" sz="1050" kern="1200" dirty="0" smtClean="0">
-              <a:solidFill>
-                <a:schemeClr val="tx1"/>
-              </a:solidFill>
-              <a:effectLst/>
-              <a:latin typeface="+mn-lt"/>
-              <a:ea typeface="+mn-ea"/>
-              <a:cs typeface="+mn-cs"/>
-            </a:endParaRPr>
-          </a:p>
-          <a:p>
-            <a:pPr lvl="1"/>
-            <a:r>
-              <a:rPr lang="en-US" sz="1200" kern="1200" dirty="0" smtClean="0">
-                <a:solidFill>
-                  <a:schemeClr val="tx1"/>
-                </a:solidFill>
-                <a:effectLst/>
-                <a:latin typeface="+mn-lt"/>
-                <a:ea typeface="+mn-ea"/>
-                <a:cs typeface="+mn-cs"/>
-              </a:rPr>
-              <a:t>you can even write tests for your pipelines </a:t>
-            </a:r>
-            <a:endParaRPr lang="en-US" sz="1050" kern="1200" dirty="0" smtClean="0">
-              <a:solidFill>
-                <a:schemeClr val="tx1"/>
-              </a:solidFill>
-              <a:effectLst/>
-              <a:latin typeface="+mn-lt"/>
-              <a:ea typeface="+mn-ea"/>
-              <a:cs typeface="+mn-cs"/>
-            </a:endParaRPr>
-          </a:p>
-          <a:p>
-            <a:r>
-              <a:rPr lang="en-US" sz="1200" kern="1200" dirty="0" smtClean="0">
-                <a:solidFill>
-                  <a:schemeClr val="tx1"/>
-                </a:solidFill>
-                <a:effectLst/>
-                <a:latin typeface="+mn-lt"/>
-                <a:ea typeface="+mn-ea"/>
-                <a:cs typeface="+mn-cs"/>
-              </a:rPr>
-              <a:t>no more clicking of jobs manually! </a:t>
-            </a:r>
-            <a:endParaRPr lang="en-US" sz="1200" kern="1200" dirty="0">
-              <a:solidFill>
-                <a:schemeClr val="tx1"/>
-              </a:solidFill>
-              <a:effectLst/>
-              <a:latin typeface="+mn-lt"/>
-              <a:ea typeface="+mn-ea"/>
-              <a:cs typeface="+mn-cs"/>
-            </a:endParaRPr>
+            <a:endParaRPr lang="en-US" dirty="0"/>
           </a:p>
         </p:txBody>
       </p:sp>
@@ -1169,7 +1052,7 @@
     </p:spTree>
     <p:extLst>
       <p:ext uri="{BB962C8B-B14F-4D97-AF65-F5344CB8AC3E}">
-        <p14:creationId xmlns:p14="http://schemas.microsoft.com/office/powerpoint/2010/main" val="1285192178"/>
+        <p14:creationId xmlns:p14="http://schemas.microsoft.com/office/powerpoint/2010/main" val="534104565"/>
       </p:ext>
     </p:extLst>
   </p:cSld>
@@ -1223,23 +1106,6 @@
           <a:bodyPr/>
           <a:lstStyle/>
           <a:p>
-            <a:pPr marL="0" marR="0" indent="0" algn="l" defTabSz="457200" rtl="0" eaLnBrk="1" fontAlgn="auto" latinLnBrk="0" hangingPunct="1">
-              <a:lnSpc>
-                <a:spcPct val="100000"/>
-              </a:lnSpc>
-              <a:spcBef>
-                <a:spcPts val="0"/>
-              </a:spcBef>
-              <a:spcAft>
-                <a:spcPts val="0"/>
-              </a:spcAft>
-              <a:buClrTx/>
-              <a:buSzTx/>
-              <a:buFontTx/>
-              <a:buNone/>
-              <a:tabLst/>
-              <a:defRPr/>
-            </a:pPr>
             <a:r>
               <a:rPr lang="en-US" sz="1200" kern="1200" dirty="0" smtClean="0">
                 <a:solidFill>
@@ -1250,7 +1116,7 @@
                 <a:ea typeface="+mn-ea"/>
                 <a:cs typeface="+mn-cs"/>
               </a:rPr>
-              <a:t>we support following automation servers out of the box </a:t>
+              <a:t>opinionated template of a deployment pipeline</a:t>
             </a:r>
           </a:p>
           <a:p>
@@ -1264,7 +1130,36 @@
                 <a:ea typeface="+mn-ea"/>
                 <a:cs typeface="+mn-cs"/>
               </a:rPr>
-              <a:t>	Concourse </a:t>
+              <a:t>based on good practices from different projects </a:t>
+            </a:r>
+          </a:p>
+          <a:p>
+            <a:r>
+              <a:rPr lang="en-US" sz="1200" kern="1200" dirty="0" smtClean="0">
+                <a:solidFill>
+                  <a:schemeClr val="tx1"/>
+                </a:solidFill>
+                <a:effectLst/>
+                <a:latin typeface="+mn-lt"/>
+                <a:ea typeface="+mn-ea"/>
+                <a:cs typeface="+mn-cs"/>
+              </a:rPr>
+              <a:t>we believe in the “Infrastructure as Code” approach </a:t>
+            </a:r>
+          </a:p>
+          <a:p>
+            <a:pPr lvl="1"/>
+            <a:r>
+              <a:rPr lang="en-US" sz="1200" kern="1200" dirty="0" smtClean="0">
+                <a:solidFill>
+                  <a:schemeClr val="tx1"/>
+                </a:solidFill>
+                <a:effectLst/>
+                <a:latin typeface="+mn-lt"/>
+                <a:ea typeface="+mn-ea"/>
+                <a:cs typeface="+mn-cs"/>
+              </a:rPr>
+              <a:t>live documentation of the infrastructure </a:t>
             </a:r>
             <a:endParaRPr lang="en-US" sz="1050" kern="1200" dirty="0" smtClean="0">
               <a:solidFill>
@@ -1277,6 +1172,7 @@
             </a:endParaRPr>
           </a:p>
           <a:p>
+            <a:pPr lvl="1"/>
             <a:r>
               <a:rPr lang="en-US" sz="1200" kern="1200" dirty="0" smtClean="0">
                 <a:solidFill>
@@ -1287,7 +1183,7 @@
                 <a:ea typeface="+mn-ea"/>
                 <a:cs typeface="+mn-cs"/>
               </a:rPr>
-              <a:t>	Jenkins using Jenkins Job DSL plugin </a:t>
+              <a:t>in case of automation server going down you can recover everything in no </a:t>
             </a:r>
             <a:endParaRPr lang="en-US" sz="1050" kern="1200" dirty="0" smtClean="0">
               <a:solidFill>
@@ -1300,6 +1196,7 @@
             </a:endParaRPr>
           </a:p>
           <a:p>
+            <a:pPr lvl="1"/>
             <a:r>
               <a:rPr lang="en-US" sz="1200" kern="1200" dirty="0" smtClean="0">
                 <a:solidFill>
@@ -1310,31 +1207,7 @@
                 <a:ea typeface="+mn-ea"/>
                 <a:cs typeface="+mn-cs"/>
               </a:rPr>
-              <a:t>	Jenkins using </a:t>
-            </a:r>
-            <a:r>
-              <a:rPr lang="en-US" sz="1200" kern="1200" dirty="0" err="1" smtClean="0">
-                <a:solidFill>
-                  <a:schemeClr val="tx1"/>
-                </a:solidFill>
-                <a:effectLst/>
-                <a:latin typeface="+mn-lt"/>
-                <a:ea typeface="+mn-ea"/>
-                <a:cs typeface="+mn-cs"/>
-              </a:rPr>
-              <a:t>Jenkinsfile</a:t>
-            </a:r>
-            <a:r>
-              <a:rPr lang="en-US" sz="1200" kern="1200" dirty="0" smtClean="0">
-                <a:solidFill>
-                  <a:schemeClr val="tx1"/>
-                </a:solidFill>
-                <a:effectLst/>
-                <a:latin typeface="+mn-lt"/>
-                <a:ea typeface="+mn-ea"/>
-                <a:cs typeface="+mn-cs"/>
-              </a:rPr>
-              <a:t> with Blue Ocean </a:t>
+              <a:t>time </a:t>
             </a:r>
             <a:endParaRPr lang="en-US" sz="1050" kern="1200" dirty="0" smtClean="0">
               <a:solidFill>
@@ -1347,6 +1220,7 @@
             </a:endParaRPr>
           </a:p>
           <a:p>
+            <a:pPr lvl="1"/>
             <a:r>
               <a:rPr lang="en-US" sz="1200" kern="1200" dirty="0" smtClean="0">
                 <a:solidFill>
@@ -1357,31 +1231,7 @@
                 <a:ea typeface="+mn-ea"/>
                 <a:cs typeface="+mn-cs"/>
               </a:rPr>
-              <a:t>Logic </a:t>
-            </a:r>
-            <a:r>
-              <a:rPr lang="en-US" sz="1200" kern="1200" baseline="0" dirty="0" smtClean="0">
-                <a:solidFill>
-                  <a:schemeClr val="tx1"/>
-                </a:solidFill>
-                <a:effectLst/>
-                <a:latin typeface="+mn-lt"/>
-                <a:ea typeface="+mn-ea"/>
-                <a:cs typeface="+mn-cs"/>
-              </a:rPr>
-              <a:t>implemented </a:t>
-            </a:r>
-            <a:r>
-              <a:rPr lang="en-US" sz="1200" kern="1200" dirty="0" smtClean="0">
-                <a:solidFill>
-                  <a:schemeClr val="tx1"/>
-                </a:solidFill>
-                <a:effectLst/>
-                <a:latin typeface="+mn-lt"/>
-                <a:ea typeface="+mn-ea"/>
-                <a:cs typeface="+mn-cs"/>
-              </a:rPr>
-              <a:t>in Bash scripts:</a:t>
+              <a:t>the automation server setup should be automated too! </a:t>
             </a:r>
             <a:endParaRPr lang="en-US" sz="1050" kern="1200" dirty="0" smtClean="0">
               <a:solidFill>
@@ -1405,7 +1255,7 @@
                 <a:ea typeface="+mn-ea"/>
                 <a:cs typeface="+mn-cs"/>
               </a:rPr>
-              <a:t>Convert the internals to suit your needs </a:t>
+              <a:t>you can even write tests for your pipelines </a:t>
             </a:r>
             <a:endParaRPr lang="en-US" sz="1050" kern="1200" dirty="0" smtClean="0">
               <a:solidFill>
@@ -1418,7 +1268,6 @@
             </a:endParaRPr>
           </a:p>
           <a:p>
-            <a:pPr lvl="1"/>
             <a:r>
               <a:rPr lang="en-US" sz="1200" kern="1200" dirty="0" smtClean="0">
                 <a:solidFill>
@@ -1429,45 +1278,9 @@
                 <a:ea typeface="+mn-ea"/>
                 <a:cs typeface="+mn-cs"/>
               </a:rPr>
-              <a:t>you can use whatever automation server you want </a:t>
-            </a:r>
-            <a:endParaRPr lang="en-US" sz="1050" kern="1200" dirty="0" smtClean="0">
-              <a:solidFill>
-                <a:schemeClr val="tx1"/>
-              </a:solidFill>
-              <a:effectLst/>
-              <a:latin typeface="+mn-lt"/>
-              <a:ea typeface="+mn-ea"/>
-              <a:cs typeface="+mn-cs"/>
-            </a:endParaRPr>
-          </a:p>
-          <a:p>
-            <a:pPr lvl="1"/>
-            <a:r>
-              <a:rPr lang="en-US" sz="1200" kern="1200" dirty="0" smtClean="0">
-                <a:solidFill>
-                  <a:schemeClr val="tx1"/>
-                </a:solidFill>
-                <a:effectLst/>
-                <a:latin typeface="+mn-lt"/>
-                <a:ea typeface="+mn-ea"/>
-                <a:cs typeface="+mn-cs"/>
-              </a:rPr>
-              <a:t>supports Maven &amp; </a:t>
-            </a:r>
-            <a:r>
-              <a:rPr lang="en-US" sz="1200" kern="1200" dirty="0" err="1" smtClean="0">
-                <a:solidFill>
-                  <a:schemeClr val="tx1"/>
-                </a:solidFill>
-                <a:effectLst/>
-                <a:latin typeface="+mn-lt"/>
-                <a:ea typeface="+mn-ea"/>
-                <a:cs typeface="+mn-cs"/>
-              </a:rPr>
-              <a:t>Gradle</a:t>
-            </a:r>
-            <a:endParaRPr lang="en-US" sz="1050" kern="1200" dirty="0">
+              <a:t>no more clicking of jobs manually! </a:t>
+            </a:r>
+            <a:endParaRPr lang="en-US" sz="1200" kern="1200" dirty="0">
               <a:solidFill>
                 <a:schemeClr val="tx1"/>
               </a:solidFill>
@@ -1576,6 +1389,233 @@
               <a:tabLst/>
               <a:defRPr/>
             </a:pPr>
+            <a:r>
+              <a:rPr lang="en-US" sz="1200" kern="1200" dirty="0" smtClean="0">
+                <a:solidFill>
+                  <a:schemeClr val="tx1"/>
+                </a:solidFill>
+                <a:effectLst/>
+                <a:latin typeface="+mn-lt"/>
+                <a:ea typeface="+mn-ea"/>
+                <a:cs typeface="+mn-cs"/>
+              </a:rPr>
+              <a:t>we support following automation servers out of the box </a:t>
+            </a:r>
+          </a:p>
+          <a:p>
+            <a:r>
+              <a:rPr lang="en-US" sz="1200" kern="1200" dirty="0" smtClean="0">
+                <a:solidFill>
+                  <a:schemeClr val="tx1"/>
+                </a:solidFill>
+                <a:effectLst/>
+                <a:latin typeface="+mn-lt"/>
+                <a:ea typeface="+mn-ea"/>
+                <a:cs typeface="+mn-cs"/>
+              </a:rPr>
+              <a:t>	Concourse </a:t>
+            </a:r>
+            <a:endParaRPr lang="en-US" sz="1050" kern="1200" dirty="0" smtClean="0">
+              <a:solidFill>
+                <a:schemeClr val="tx1"/>
+              </a:solidFill>
+              <a:effectLst/>
+              <a:latin typeface="+mn-lt"/>
+              <a:ea typeface="+mn-ea"/>
+              <a:cs typeface="+mn-cs"/>
+            </a:endParaRPr>
+          </a:p>
+          <a:p>
+            <a:r>
+              <a:rPr lang="en-US" sz="1200" kern="1200" dirty="0" smtClean="0">
+                <a:solidFill>
+                  <a:schemeClr val="tx1"/>
+                </a:solidFill>
+                <a:effectLst/>
+                <a:latin typeface="+mn-lt"/>
+                <a:ea typeface="+mn-ea"/>
+                <a:cs typeface="+mn-cs"/>
+              </a:rPr>
+              <a:t>	Jenkins using Jenkins Job DSL plugin </a:t>
+            </a:r>
+            <a:endParaRPr lang="en-US" sz="1050" kern="1200" dirty="0" smtClean="0">
+              <a:solidFill>
+                <a:schemeClr val="tx1"/>
+              </a:solidFill>
+              <a:effectLst/>
+              <a:latin typeface="+mn-lt"/>
+              <a:ea typeface="+mn-ea"/>
+              <a:cs typeface="+mn-cs"/>
+            </a:endParaRPr>
+          </a:p>
+          <a:p>
+            <a:r>
+              <a:rPr lang="en-US" sz="1200" kern="1200" dirty="0" smtClean="0">
+                <a:solidFill>
+                  <a:schemeClr val="tx1"/>
+                </a:solidFill>
+                <a:effectLst/>
+                <a:latin typeface="+mn-lt"/>
+                <a:ea typeface="+mn-ea"/>
+                <a:cs typeface="+mn-cs"/>
+              </a:rPr>
+              <a:t>	Jenkins using </a:t>
+            </a:r>
+            <a:r>
+              <a:rPr lang="en-US" sz="1200" kern="1200" dirty="0" err="1" smtClean="0">
+                <a:solidFill>
+                  <a:schemeClr val="tx1"/>
+                </a:solidFill>
+                <a:effectLst/>
+                <a:latin typeface="+mn-lt"/>
+                <a:ea typeface="+mn-ea"/>
+                <a:cs typeface="+mn-cs"/>
+              </a:rPr>
+              <a:t>Jenkinsfile</a:t>
+            </a:r>
+            <a:r>
+              <a:rPr lang="en-US" sz="1200" kern="1200" dirty="0" smtClean="0">
+                <a:solidFill>
+                  <a:schemeClr val="tx1"/>
+                </a:solidFill>
+                <a:effectLst/>
+                <a:latin typeface="+mn-lt"/>
+                <a:ea typeface="+mn-ea"/>
+                <a:cs typeface="+mn-cs"/>
+              </a:rPr>
+              <a:t> with Blue Ocean </a:t>
+            </a:r>
+            <a:endParaRPr lang="en-US" sz="1050" kern="1200" dirty="0" smtClean="0">
+              <a:solidFill>
+                <a:schemeClr val="tx1"/>
+              </a:solidFill>
+              <a:effectLst/>
+              <a:latin typeface="+mn-lt"/>
+              <a:ea typeface="+mn-ea"/>
+              <a:cs typeface="+mn-cs"/>
+            </a:endParaRPr>
+          </a:p>
+          <a:p>
+            <a:r>
+              <a:rPr lang="en-US" sz="1200" kern="1200" dirty="0" smtClean="0">
+                <a:solidFill>
+                  <a:schemeClr val="tx1"/>
+                </a:solidFill>
+                <a:effectLst/>
+                <a:latin typeface="+mn-lt"/>
+                <a:ea typeface="+mn-ea"/>
+                <a:cs typeface="+mn-cs"/>
+              </a:rPr>
+              <a:t>Logic </a:t>
+            </a:r>
+            <a:r>
+              <a:rPr lang="en-US" sz="1200" kern="1200" baseline="0" dirty="0" smtClean="0">
+                <a:solidFill>
+                  <a:schemeClr val="tx1"/>
+                </a:solidFill>
+                <a:effectLst/>
+                <a:latin typeface="+mn-lt"/>
+                <a:ea typeface="+mn-ea"/>
+                <a:cs typeface="+mn-cs"/>
+              </a:rPr>
+              <a:t>implemented </a:t>
+            </a:r>
+            <a:r>
+              <a:rPr lang="en-US" sz="1200" kern="1200" dirty="0" smtClean="0">
+                <a:solidFill>
+                  <a:schemeClr val="tx1"/>
+                </a:solidFill>
+                <a:effectLst/>
+                <a:latin typeface="+mn-lt"/>
+                <a:ea typeface="+mn-ea"/>
+                <a:cs typeface="+mn-cs"/>
+              </a:rPr>
+              <a:t>in Bash scripts:</a:t>
+            </a:r>
+            <a:endParaRPr lang="en-US" sz="1050" kern="1200" dirty="0" smtClean="0">
+              <a:solidFill>
+                <a:schemeClr val="tx1"/>
+              </a:solidFill>
+              <a:effectLst/>
+              <a:latin typeface="+mn-lt"/>
+              <a:ea typeface="+mn-ea"/>
+              <a:cs typeface="+mn-cs"/>
+            </a:endParaRPr>
+          </a:p>
+          <a:p>
+            <a:pPr lvl="1"/>
+            <a:r>
+              <a:rPr lang="en-US" sz="1200" kern="1200" dirty="0" smtClean="0">
+                <a:solidFill>
+                  <a:schemeClr val="tx1"/>
+                </a:solidFill>
+                <a:effectLst/>
+                <a:latin typeface="+mn-lt"/>
+                <a:ea typeface="+mn-ea"/>
+                <a:cs typeface="+mn-cs"/>
+              </a:rPr>
+              <a:t>Convert the internals to suit your needs </a:t>
+            </a:r>
+            <a:endParaRPr lang="en-US" sz="1050" kern="1200" dirty="0" smtClean="0">
+              <a:solidFill>
+                <a:schemeClr val="tx1"/>
+              </a:solidFill>
+              <a:effectLst/>
+              <a:latin typeface="+mn-lt"/>
+              <a:ea typeface="+mn-ea"/>
+              <a:cs typeface="+mn-cs"/>
+            </a:endParaRPr>
+          </a:p>
+          <a:p>
+            <a:pPr lvl="1"/>
+            <a:r>
+              <a:rPr lang="en-US" sz="1200" kern="1200" dirty="0" smtClean="0">
+                <a:solidFill>
+                  <a:schemeClr val="tx1"/>
+                </a:solidFill>
+                <a:effectLst/>
+                <a:latin typeface="+mn-lt"/>
+                <a:ea typeface="+mn-ea"/>
+                <a:cs typeface="+mn-cs"/>
+              </a:rPr>
+              <a:t>you can use whatever automation server you want </a:t>
+            </a:r>
+            <a:endParaRPr lang="en-US" sz="1050" kern="1200" dirty="0" smtClean="0">
+              <a:solidFill>
+                <a:schemeClr val="tx1"/>
+              </a:solidFill>
+              <a:effectLst/>
+              <a:latin typeface="+mn-lt"/>
+              <a:ea typeface="+mn-ea"/>
+              <a:cs typeface="+mn-cs"/>
+            </a:endParaRPr>
+          </a:p>
+          <a:p>
+            <a:pPr lvl="1"/>
+            <a:r>
+              <a:rPr lang="en-US" sz="1200" kern="1200" dirty="0" smtClean="0">
+                <a:solidFill>
+                  <a:schemeClr val="tx1"/>
+                </a:solidFill>
+                <a:effectLst/>
+                <a:latin typeface="+mn-lt"/>
+                <a:ea typeface="+mn-ea"/>
+                <a:cs typeface="+mn-cs"/>
+              </a:rPr>
+              <a:t>supports Maven &amp; </a:t>
+            </a:r>
+            <a:r>
+              <a:rPr lang="en-US" sz="1200" kern="1200" dirty="0" err="1" smtClean="0">
+                <a:solidFill>
+                  <a:schemeClr val="tx1"/>
+                </a:solidFill>
+                <a:effectLst/>
+                <a:latin typeface="+mn-lt"/>
+                <a:ea typeface="+mn-ea"/>
+                <a:cs typeface="+mn-cs"/>
+              </a:rPr>
+              <a:t>Gradle</a:t>
+            </a:r>
             <a:endParaRPr lang="en-US" sz="1050" kern="1200" dirty="0">
               <a:solidFill>
                 <a:schemeClr val="tx1"/>
@@ -1777,23 +1817,32 @@
           <a:bodyPr/>
           <a:lstStyle/>
           <a:p>
-            <a:r>
-              <a:rPr lang="en-US" dirty="0" smtClean="0"/>
-              <a:t>We</a:t>
-            </a:r>
-            <a:r>
-              <a:rPr lang="en-US" baseline="0" dirty="0" smtClean="0"/>
-              <a:t> mentioned a few 3</a:t>
-            </a:r>
-            <a:r>
-              <a:rPr lang="en-US" baseline="30000" dirty="0" smtClean="0"/>
-              <a:t>rd</a:t>
-            </a:r>
-            <a:r>
-              <a:rPr lang="en-US" baseline="0" dirty="0" smtClean="0"/>
-              <a:t> parties, here’s more information on each if needed.</a:t>
-            </a:r>
-            <a:endParaRPr lang="en-US" dirty="0"/>
+            <a:pPr marL="0" marR="0" indent="0" algn="l" defTabSz="457200" rtl="0" eaLnBrk="1" fontAlgn="auto" latinLnBrk="0" hangingPunct="1">
+              <a:lnSpc>
+                <a:spcPct val="100000"/>
+              </a:lnSpc>
+              <a:spcBef>
+                <a:spcPts val="0"/>
+              </a:spcBef>
+              <a:spcAft>
+                <a:spcPts val="0"/>
+              </a:spcAft>
+              <a:buClrTx/>
+              <a:buSzTx/>
+              <a:buFontTx/>
+              <a:buNone/>
+              <a:tabLst/>
+              <a:defRPr/>
+            </a:pPr>
+            <a:endParaRPr lang="en-US" sz="1050" kern="1200" dirty="0">
+              <a:solidFill>
+                <a:schemeClr val="tx1"/>
+              </a:solidFill>
+              <a:effectLst/>
+              <a:latin typeface="+mn-lt"/>
+              <a:ea typeface="+mn-ea"/>
+              <a:cs typeface="+mn-cs"/>
+            </a:endParaRPr>
           </a:p>
         </p:txBody>
       </p:sp>
@@ -1814,7 +1863,7 @@
           <a:p>
             <a:fld id="{9BEDBE90-FDBE-A44D-9062-5A5D1585D5B8}" type="slidenum">
               <a:rPr lang="en-US" smtClean="0"/>
-              <a:t>17</a:t>
+              <a:t>15</a:t>
             </a:fld>
             <a:endParaRPr lang="en-US"/>
           </a:p>
@@ -1823,7 +1872,7 @@
     </p:spTree>
     <p:extLst>
       <p:ext uri="{BB962C8B-B14F-4D97-AF65-F5344CB8AC3E}">
-        <p14:creationId xmlns:p14="http://schemas.microsoft.com/office/powerpoint/2010/main" val="3178387251"/>
+        <p14:creationId xmlns:p14="http://schemas.microsoft.com/office/powerpoint/2010/main" val="1285192178"/>
       </p:ext>
     </p:extLst>
   </p:cSld>
@@ -1879,7 +1928,19 @@
           <a:p>
             <a:r>
               <a:rPr lang="en-US" dirty="0" smtClean="0"/>
-              <a:t>Questions?</a:t>
+              <a:t>We</a:t>
+            </a:r>
+            <a:r>
+              <a:rPr lang="en-US" baseline="0" dirty="0" smtClean="0"/>
+              <a:t> mentioned a few 3</a:t>
+            </a:r>
+            <a:r>
+              <a:rPr lang="en-US" baseline="30000" dirty="0" smtClean="0"/>
+              <a:t>rd</a:t>
+            </a:r>
+            <a:r>
+              <a:rPr lang="en-US" baseline="0" dirty="0" smtClean="0"/>
+              <a:t> parties, here’s more information on each if needed.</a:t>
             </a:r>
             <a:endParaRPr lang="en-US" dirty="0"/>
           </a:p>
@@ -1902,7 +1963,95 @@
           <a:p>
             <a:fld id="{9BEDBE90-FDBE-A44D-9062-5A5D1585D5B8}" type="slidenum">
               <a:rPr lang="en-US" smtClean="0"/>
-              <a:t>24</a:t>
+              <a:t>18</a:t>
+            </a:fld>
+            <a:endParaRPr lang="en-US"/>
+          </a:p>
+        </p:txBody>
+      </p:sp>
+    </p:spTree>
+    <p:extLst>
+      <p:ext uri="{BB962C8B-B14F-4D97-AF65-F5344CB8AC3E}">
+        <p14:creationId xmlns:p14="http://schemas.microsoft.com/office/powerpoint/2010/main" val="3178387251"/>
+      </p:ext>
+    </p:extLst>
+  </p:cSld>
+  <p:clrMapOvr>
+    <a:masterClrMapping/>
+  </p:clrMapOvr>
+</p:notes>
+</file>
+
+<file path=ppt/notesSlides/notesSlide17.xml><?xml version="1.0" encoding="utf-8"?>
+<p:notes xmlns:a="http://schemas.openxmlformats.org/drawingml/2006/main" xmlns:r="http://schemas.openxmlformats.org/officeDocument/2006/relationships" xmlns:p="http://schemas.openxmlformats.org/presentationml/2006/main">
+  <p:cSld>
+    <p:spTree>
+      <p:nvGrpSpPr>
+        <p:cNvPr id="1" name=""/>
+        <p:cNvGrpSpPr/>
+        <p:nvPr/>
+      </p:nvGrpSpPr>
+      <p:grpSpPr>
+        <a:xfrm>
+          <a:off x="0" y="0"/>
+          <a:ext cx="0" cy="0"/>
+          <a:chOff x="0" y="0"/>
+          <a:chExt cx="0" cy="0"/>
+        </a:xfrm>
+      </p:grpSpPr>
+      <p:sp>
+        <p:nvSpPr>
+          <p:cNvPr id="2" name="Slide Image Placeholder 1"/>
+          <p:cNvSpPr>
+            <a:spLocks noGrp="1" noRot="1" noChangeAspect="1"/>
+          </p:cNvSpPr>
+          <p:nvPr>
+            <p:ph type="sldImg"/>
+          </p:nvPr>
+        </p:nvSpPr>
+        <p:spPr/>
+      </p:sp>
+      <p:sp>
+        <p:nvSpPr>
+          <p:cNvPr id="3" name="Notes Placeholder 2"/>
+          <p:cNvSpPr>
+            <a:spLocks noGrp="1"/>
+          </p:cNvSpPr>
+          <p:nvPr>
+            <p:ph type="body" idx="1"/>
+          </p:nvPr>
+        </p:nvSpPr>
+        <p:spPr/>
+        <p:txBody>
+          <a:bodyPr/>
+          <a:lstStyle/>
+          <a:p>
+            <a:r>
+              <a:rPr lang="en-US" dirty="0" smtClean="0"/>
+              <a:t>Questions?</a:t>
+            </a:r>
+            <a:endParaRPr lang="en-US" dirty="0"/>
+          </a:p>
+        </p:txBody>
+      </p:sp>
+      <p:sp>
+        <p:nvSpPr>
+          <p:cNvPr id="4" name="Slide Number Placeholder 3"/>
+          <p:cNvSpPr>
+            <a:spLocks noGrp="1"/>
+          </p:cNvSpPr>
+          <p:nvPr>
+            <p:ph type="sldNum" sz="quarter" idx="10"/>
+          </p:nvPr>
+        </p:nvSpPr>
+        <p:spPr/>
+        <p:txBody>
+          <a:bodyPr/>
+          <a:lstStyle/>
+          <a:p>
+            <a:fld id="{9BEDBE90-FDBE-A44D-9062-5A5D1585D5B8}" type="slidenum">
+              <a:rPr lang="en-US" smtClean="0"/>
+              <a:t>25</a:t>
             </a:fld>
             <a:endParaRPr lang="en-US"/>
           </a:p>
@@ -2248,7 +2397,11 @@
             </a:pPr>
             <a:r>
               <a:rPr lang="en-US" dirty="0" smtClean="0"/>
-              <a:t>Why does it matter to customers?</a:t>
+              <a:t>Why </a:t>
+            </a:r>
+            <a:r>
+              <a:rPr lang="en-US" dirty="0" smtClean="0"/>
+              <a:t>does it matter to customers?</a:t>
             </a:r>
           </a:p>
           <a:p>
@@ -2265,7 +2418,11 @@
             </a:pPr>
             <a:r>
               <a:rPr lang="en-US" dirty="0" smtClean="0"/>
-              <a:t>Tighter loops are good for innovation. It gives you more feedback and lets you explore, learn, and try out more things while controlling risk. These smaller loops can also just increase quality (finding defects in smaller batches of code is easier than larger batches of code, reducing risk), but that’s only part of the story Full value requires using the opportunity given by smaller loops to incrementally improve the product in week (or whatever the release period is) cycles instead of the traditionally long cycles of 6 to 12 months.</a:t>
+              <a:t>Tighter loops are good for innovation. It gives you more feedback and lets you explore, learn, and try out more things while controlling risk. These smaller loops can also just increase quality (finding defects in smaller batches of code is easier than larger batches of code, reducing risk), but that’s only part of the story Full value requires using the opportunity given by smaller loops to incrementally improve the product in week (or whatever the release period is) cycles instead of the traditionally long cycles of 6 to 12 months</a:t>
+            </a:r>
+            <a:r>
+              <a:rPr lang="en-US" dirty="0" smtClean="0"/>
+              <a:t>.</a:t>
             </a:r>
           </a:p>
           <a:p>
@@ -2281,6 +2438,78 @@
               <a:buNone/>
             </a:pPr>
             <a:endParaRPr lang="en-US" dirty="0" smtClean="0"/>
+          </a:p>
+          <a:p>
+            <a:pPr marL="0" indent="0">
+              <a:spcBef>
+                <a:spcPts val="0"/>
+              </a:spcBef>
+              <a:buClr>
+                <a:schemeClr val="tx1"/>
+              </a:buClr>
+              <a:buSzPct val="100000"/>
+              <a:buNone/>
+            </a:pPr>
+            <a:r>
+              <a:rPr lang="en-US" sz="1200" dirty="0" smtClean="0">
+                <a:solidFill>
+                  <a:srgbClr val="FFFFFF"/>
+                </a:solidFill>
+                <a:latin typeface="Proxima Nova"/>
+                <a:ea typeface="Arial"/>
+                <a:cs typeface="Proxima Nova"/>
+                <a:sym typeface="Arial"/>
+              </a:rPr>
+              <a:t>Good for innovation-driven projects that must continually improve</a:t>
+            </a:r>
+          </a:p>
+          <a:p>
+            <a:pPr marL="0" indent="0">
+              <a:spcBef>
+                <a:spcPts val="1200"/>
+              </a:spcBef>
+              <a:buClr>
+                <a:schemeClr val="tx1"/>
+              </a:buClr>
+              <a:buSzPct val="100000"/>
+              <a:buNone/>
+            </a:pPr>
+            <a:r>
+              <a:rPr lang="en-US" sz="1200" dirty="0" smtClean="0">
+                <a:solidFill>
+                  <a:srgbClr val="FFFFFF"/>
+                </a:solidFill>
+                <a:latin typeface="Proxima Nova"/>
+                <a:ea typeface="Arial"/>
+                <a:cs typeface="Proxima Nova"/>
+                <a:sym typeface="Arial"/>
+              </a:rPr>
+              <a:t>Increases speed &amp; quality by shifting to smaller batches, while reducing risk</a:t>
+            </a:r>
+          </a:p>
+          <a:p>
+            <a:pPr marL="0" indent="0">
+              <a:spcBef>
+                <a:spcPts val="1200"/>
+              </a:spcBef>
+              <a:buClr>
+                <a:schemeClr val="tx1"/>
+              </a:buClr>
+              <a:buSzPct val="100000"/>
+              <a:buNone/>
+            </a:pPr>
+            <a:r>
+              <a:rPr lang="en-US" sz="1200" dirty="0" smtClean="0">
+                <a:solidFill>
+                  <a:srgbClr val="FFFFFF"/>
+                </a:solidFill>
+                <a:latin typeface="Proxima Nova"/>
+                <a:ea typeface="Arial"/>
+                <a:cs typeface="Proxima Nova"/>
+                <a:sym typeface="Arial"/>
+              </a:rPr>
+              <a:t>Frequent releases increases the amount of feedback used for product management</a:t>
+            </a:r>
           </a:p>
           <a:p>
             <a:pPr marL="0" marR="0" lvl="0" indent="0" algn="l" rtl="0">
@@ -5039,6 +5268,576 @@
       </p:par>
     </p:tnLst>
   </p:timing>
+</p:sldLayout>
+</file>
+
+<file path=ppt/slideLayouts/slideLayout10.xml><?xml version="1.0" encoding="utf-8"?>
+<p:sldLayout xmlns:a="http://schemas.openxmlformats.org/drawingml/2006/main" xmlns:r="http://schemas.openxmlformats.org/officeDocument/2006/relationships" xmlns:p="http://schemas.openxmlformats.org/presentationml/2006/main">
+  <p:cSld name="Temp Basic without Rule">
+    <p:bg>
+      <p:bgPr>
+        <a:solidFill>
+          <a:srgbClr val="17232A"/>
+        </a:solidFill>
+        <a:effectLst/>
+      </p:bgPr>
+    </p:bg>
+    <p:spTree>
+      <p:nvGrpSpPr>
+        <p:cNvPr id="1" name="Shape 250"/>
+        <p:cNvGrpSpPr/>
+        <p:nvPr/>
+      </p:nvGrpSpPr>
+      <p:grpSpPr>
+        <a:xfrm>
+          <a:off x="0" y="0"/>
+          <a:ext cx="0" cy="0"/>
+          <a:chOff x="0" y="0"/>
+          <a:chExt cx="0" cy="0"/>
+        </a:xfrm>
+      </p:grpSpPr>
+      <p:sp>
+        <p:nvSpPr>
+          <p:cNvPr id="251" name="Shape 251"/>
+          <p:cNvSpPr/>
+          <p:nvPr/>
+        </p:nvSpPr>
+        <p:spPr>
+          <a:xfrm>
+            <a:off x="0" y="4629150"/>
+            <a:ext cx="9144000" cy="385800"/>
+          </a:xfrm>
+          <a:prstGeom prst="rect">
+            <a:avLst/>
+          </a:prstGeom>
+          <a:solidFill>
+            <a:srgbClr val="00786E"/>
+          </a:solidFill>
+          <a:ln>
+            <a:noFill/>
+          </a:ln>
+        </p:spPr>
+        <p:txBody>
+          <a:bodyPr wrap="square" lIns="91425" tIns="45700" rIns="91425" bIns="45700" anchor="ctr" anchorCtr="0">
+            <a:noAutofit/>
+          </a:bodyPr>
+          <a:lstStyle/>
+          <a:p>
+            <a:pPr marL="0" marR="0" lvl="0" indent="0" algn="l" rtl="0">
+              <a:spcBef>
+                <a:spcPts val="0"/>
+              </a:spcBef>
+              <a:buNone/>
+            </a:pPr>
+            <a:endParaRPr sz="1800" b="0" i="0" u="none" strike="noStrike" cap="none">
+              <a:solidFill>
+                <a:schemeClr val="lt1"/>
+              </a:solidFill>
+              <a:latin typeface="Source Sans Pro"/>
+              <a:ea typeface="Source Sans Pro"/>
+              <a:cs typeface="Source Sans Pro"/>
+              <a:sym typeface="Source Sans Pro"/>
+            </a:endParaRPr>
+          </a:p>
+        </p:txBody>
+      </p:sp>
+      <p:sp>
+        <p:nvSpPr>
+          <p:cNvPr id="252" name="Shape 252"/>
+          <p:cNvSpPr txBox="1"/>
+          <p:nvPr/>
+        </p:nvSpPr>
+        <p:spPr>
+          <a:xfrm>
+            <a:off x="366712" y="5018448"/>
+            <a:ext cx="2274900" cy="92400"/>
+          </a:xfrm>
+          <a:prstGeom prst="rect">
+            <a:avLst/>
+          </a:prstGeom>
+          <a:noFill/>
+          <a:ln>
+            <a:noFill/>
+          </a:ln>
+        </p:spPr>
+        <p:txBody>
+          <a:bodyPr wrap="square" lIns="0" tIns="0" rIns="0" bIns="0" anchor="t" anchorCtr="0">
+            <a:noAutofit/>
+          </a:bodyPr>
+          <a:lstStyle/>
+          <a:p>
+            <a:pPr marL="0" marR="0" lvl="0" indent="0" algn="l" rtl="0">
+              <a:spcBef>
+                <a:spcPts val="0"/>
+              </a:spcBef>
+              <a:buSzPct val="25000"/>
+              <a:buNone/>
+            </a:pPr>
+            <a:r>
+              <a:rPr lang="en-US" sz="600" b="0" i="0" u="none" strike="noStrike" cap="none">
+                <a:solidFill>
+                  <a:srgbClr val="7F7F7F"/>
+                </a:solidFill>
+                <a:latin typeface="Arial"/>
+                <a:ea typeface="Arial"/>
+                <a:cs typeface="Arial"/>
+                <a:sym typeface="Arial"/>
+              </a:rPr>
+              <a:t>© Copyright 201</a:t>
+            </a:r>
+            <a:r>
+              <a:rPr lang="en-US" sz="600">
+                <a:solidFill>
+                  <a:srgbClr val="7F7F7F"/>
+                </a:solidFill>
+              </a:rPr>
+              <a:t>6</a:t>
+            </a:r>
+            <a:r>
+              <a:rPr lang="en-US" sz="600" b="0" i="0" u="none" strike="noStrike" cap="none">
+                <a:solidFill>
+                  <a:srgbClr val="7F7F7F"/>
+                </a:solidFill>
+                <a:latin typeface="Arial"/>
+                <a:ea typeface="Arial"/>
+                <a:cs typeface="Arial"/>
+                <a:sym typeface="Arial"/>
+              </a:rPr>
+              <a:t> Pivotal. All rights reserved.</a:t>
+            </a:r>
+          </a:p>
+        </p:txBody>
+      </p:sp>
+      <p:pic>
+        <p:nvPicPr>
+          <p:cNvPr id="253" name="Shape 253" descr="Pivotal_Logo_white.png"/>
+          <p:cNvPicPr preferRelativeResize="0"/>
+          <p:nvPr/>
+        </p:nvPicPr>
+        <p:blipFill rotWithShape="1">
+          <a:blip r:embed="rId2">
+            <a:alphaModFix/>
+          </a:blip>
+          <a:srcRect/>
+          <a:stretch/>
+        </p:blipFill>
+        <p:spPr>
+          <a:xfrm>
+            <a:off x="7941732" y="4713966"/>
+            <a:ext cx="957300" cy="219600"/>
+          </a:xfrm>
+          <a:prstGeom prst="rect">
+            <a:avLst/>
+          </a:prstGeom>
+          <a:noFill/>
+          <a:ln>
+            <a:noFill/>
+          </a:ln>
+        </p:spPr>
+      </p:pic>
+      <p:sp>
+        <p:nvSpPr>
+          <p:cNvPr id="254" name="Shape 254"/>
+          <p:cNvSpPr txBox="1">
+            <a:spLocks noGrp="1"/>
+          </p:cNvSpPr>
+          <p:nvPr>
+            <p:ph type="title"/>
+          </p:nvPr>
+        </p:nvSpPr>
+        <p:spPr>
+          <a:xfrm>
+            <a:off x="457199" y="320039"/>
+            <a:ext cx="8229600" cy="363600"/>
+          </a:xfrm>
+          <a:prstGeom prst="rect">
+            <a:avLst/>
+          </a:prstGeom>
+          <a:noFill/>
+          <a:ln>
+            <a:noFill/>
+          </a:ln>
+        </p:spPr>
+        <p:txBody>
+          <a:bodyPr wrap="square" lIns="91425" tIns="91425" rIns="91425" bIns="91425" anchor="ctr" anchorCtr="0"/>
+          <a:lstStyle>
+            <a:lvl1pPr marL="0" marR="0" lvl="0" indent="0" algn="l" rtl="0">
+              <a:spcBef>
+                <a:spcPts val="0"/>
+              </a:spcBef>
+              <a:buClr>
+                <a:schemeClr val="lt1"/>
+              </a:buClr>
+              <a:buFont typeface="Arial"/>
+              <a:buNone/>
+              <a:defRPr sz="3200" b="0" i="0" u="none" strike="noStrike" cap="none">
+                <a:solidFill>
+                  <a:schemeClr val="lt1"/>
+                </a:solidFill>
+                <a:latin typeface="Arial"/>
+                <a:ea typeface="Arial"/>
+                <a:cs typeface="Arial"/>
+                <a:sym typeface="Arial"/>
+              </a:defRPr>
+            </a:lvl1pPr>
+            <a:lvl2pPr lvl="1" indent="0" rtl="0">
+              <a:spcBef>
+                <a:spcPts val="0"/>
+              </a:spcBef>
+              <a:buNone/>
+              <a:defRPr sz="1800"/>
+            </a:lvl2pPr>
+            <a:lvl3pPr lvl="2" indent="0" rtl="0">
+              <a:spcBef>
+                <a:spcPts val="0"/>
+              </a:spcBef>
+              <a:buNone/>
+              <a:defRPr sz="1800"/>
+            </a:lvl3pPr>
+            <a:lvl4pPr lvl="3" indent="0" rtl="0">
+              <a:spcBef>
+                <a:spcPts val="0"/>
+              </a:spcBef>
+              <a:buNone/>
+              <a:defRPr sz="1800"/>
+            </a:lvl4pPr>
+            <a:lvl5pPr lvl="4" indent="0" rtl="0">
+              <a:spcBef>
+                <a:spcPts val="0"/>
+              </a:spcBef>
+              <a:buNone/>
+              <a:defRPr sz="1800"/>
+            </a:lvl5pPr>
+            <a:lvl6pPr lvl="5" indent="0" rtl="0">
+              <a:spcBef>
+                <a:spcPts val="0"/>
+              </a:spcBef>
+              <a:buNone/>
+              <a:defRPr sz="1800"/>
+            </a:lvl6pPr>
+            <a:lvl7pPr lvl="6" indent="0" rtl="0">
+              <a:spcBef>
+                <a:spcPts val="0"/>
+              </a:spcBef>
+              <a:buNone/>
+              <a:defRPr sz="1800"/>
+            </a:lvl7pPr>
+            <a:lvl8pPr lvl="7" indent="0" rtl="0">
+              <a:spcBef>
+                <a:spcPts val="0"/>
+              </a:spcBef>
+              <a:buNone/>
+              <a:defRPr sz="1800"/>
+            </a:lvl8pPr>
+            <a:lvl9pPr lvl="8" indent="0" rtl="0">
+              <a:spcBef>
+                <a:spcPts val="0"/>
+              </a:spcBef>
+              <a:buNone/>
+              <a:defRPr sz="1800"/>
+            </a:lvl9pPr>
+          </a:lstStyle>
+          <a:p>
+            <a:endParaRPr/>
+          </a:p>
+        </p:txBody>
+      </p:sp>
+      <p:sp>
+        <p:nvSpPr>
+          <p:cNvPr id="255" name="Shape 255"/>
+          <p:cNvSpPr txBox="1">
+            <a:spLocks noGrp="1"/>
+          </p:cNvSpPr>
+          <p:nvPr>
+            <p:ph type="body" idx="1"/>
+          </p:nvPr>
+        </p:nvSpPr>
+        <p:spPr>
+          <a:xfrm>
+            <a:off x="457200" y="1108074"/>
+            <a:ext cx="8229600" cy="3082800"/>
+          </a:xfrm>
+          <a:prstGeom prst="rect">
+            <a:avLst/>
+          </a:prstGeom>
+          <a:noFill/>
+          <a:ln>
+            <a:noFill/>
+          </a:ln>
+        </p:spPr>
+        <p:txBody>
+          <a:bodyPr wrap="square" lIns="91425" tIns="91425" rIns="91425" bIns="91425" anchor="t" anchorCtr="0"/>
+          <a:lstStyle>
+            <a:lvl1pPr marL="342900" marR="0" lvl="0" indent="-165100" algn="l" rtl="0">
+              <a:spcBef>
+                <a:spcPts val="560"/>
+              </a:spcBef>
+              <a:buClr>
+                <a:schemeClr val="lt1"/>
+              </a:buClr>
+              <a:buSzPct val="100000"/>
+              <a:buFont typeface="Arial"/>
+              <a:buChar char="•"/>
+              <a:defRPr sz="2800" b="0" i="0" u="none" strike="noStrike" cap="none">
+                <a:solidFill>
+                  <a:schemeClr val="lt1"/>
+                </a:solidFill>
+                <a:latin typeface="Arial"/>
+                <a:ea typeface="Arial"/>
+                <a:cs typeface="Arial"/>
+                <a:sym typeface="Arial"/>
+              </a:defRPr>
+            </a:lvl1pPr>
+            <a:lvl2pPr marL="742950" marR="0" lvl="1" indent="-133350" algn="l" rtl="0">
+              <a:spcBef>
+                <a:spcPts val="480"/>
+              </a:spcBef>
+              <a:buClr>
+                <a:schemeClr val="lt1"/>
+              </a:buClr>
+              <a:buSzPct val="100000"/>
+              <a:buFont typeface="Arial"/>
+              <a:buChar char="–"/>
+              <a:defRPr sz="2400" b="0" i="0" u="none" strike="noStrike" cap="none">
+                <a:solidFill>
+                  <a:schemeClr val="lt1"/>
+                </a:solidFill>
+                <a:latin typeface="Arial"/>
+                <a:ea typeface="Arial"/>
+                <a:cs typeface="Arial"/>
+                <a:sym typeface="Arial"/>
+              </a:defRPr>
+            </a:lvl2pPr>
+            <a:lvl3pPr marL="1143000" marR="0" lvl="2" indent="-101600" algn="l" rtl="0">
+              <a:spcBef>
+                <a:spcPts val="400"/>
+              </a:spcBef>
+              <a:buClr>
+                <a:schemeClr val="lt1"/>
+              </a:buClr>
+              <a:buSzPct val="100000"/>
+              <a:buFont typeface="Arial"/>
+              <a:buChar char="•"/>
+              <a:defRPr sz="2000" b="0" i="0" u="none" strike="noStrike" cap="none">
+                <a:solidFill>
+                  <a:schemeClr val="lt1"/>
+                </a:solidFill>
+                <a:latin typeface="Arial"/>
+                <a:ea typeface="Arial"/>
+                <a:cs typeface="Arial"/>
+                <a:sym typeface="Arial"/>
+              </a:defRPr>
+            </a:lvl3pPr>
+            <a:lvl4pPr marL="1600200" marR="0" lvl="3" indent="-114300" algn="l" rtl="0">
+              <a:spcBef>
+                <a:spcPts val="360"/>
+              </a:spcBef>
+              <a:buClr>
+                <a:schemeClr val="lt1"/>
+              </a:buClr>
+              <a:buSzPct val="100000"/>
+              <a:buFont typeface="Arial"/>
+              <a:buChar char="–"/>
+              <a:defRPr sz="1800" b="0" i="0" u="none" strike="noStrike" cap="none">
+                <a:solidFill>
+                  <a:schemeClr val="lt1"/>
+                </a:solidFill>
+                <a:latin typeface="Arial"/>
+                <a:ea typeface="Arial"/>
+                <a:cs typeface="Arial"/>
+                <a:sym typeface="Arial"/>
+              </a:defRPr>
+            </a:lvl4pPr>
+            <a:lvl5pPr marL="2057400" marR="0" lvl="4" indent="-114300" algn="l" rtl="0">
+              <a:spcBef>
+                <a:spcPts val="360"/>
+              </a:spcBef>
+              <a:buClr>
+                <a:schemeClr val="lt1"/>
+              </a:buClr>
+              <a:buSzPct val="100000"/>
+              <a:buFont typeface="Arial"/>
+              <a:buChar char="»"/>
+              <a:defRPr sz="1800" b="0" i="0" u="none" strike="noStrike" cap="none">
+                <a:solidFill>
+                  <a:schemeClr val="lt1"/>
+                </a:solidFill>
+                <a:latin typeface="Arial"/>
+                <a:ea typeface="Arial"/>
+                <a:cs typeface="Arial"/>
+                <a:sym typeface="Arial"/>
+              </a:defRPr>
+            </a:lvl5pPr>
+            <a:lvl6pPr marL="2514600" marR="0" lvl="5" indent="-101600" algn="l" rtl="0">
+              <a:spcBef>
+                <a:spcPts val="400"/>
+              </a:spcBef>
+              <a:buClr>
+                <a:schemeClr val="dk1"/>
+              </a:buClr>
+              <a:buSzPct val="100000"/>
+              <a:buFont typeface="Arial"/>
+              <a:buChar char="•"/>
+              <a:defRPr sz="2000" b="0" i="0" u="none" strike="noStrike" cap="none">
+                <a:solidFill>
+                  <a:schemeClr val="dk1"/>
+                </a:solidFill>
+                <a:latin typeface="Source Sans Pro"/>
+                <a:ea typeface="Source Sans Pro"/>
+                <a:cs typeface="Source Sans Pro"/>
+                <a:sym typeface="Source Sans Pro"/>
+              </a:defRPr>
+            </a:lvl6pPr>
+            <a:lvl7pPr marL="2971800" marR="0" lvl="6" indent="-101600" algn="l" rtl="0">
+              <a:spcBef>
+                <a:spcPts val="400"/>
+              </a:spcBef>
+              <a:buClr>
+                <a:schemeClr val="dk1"/>
+              </a:buClr>
+              <a:buSzPct val="100000"/>
+              <a:buFont typeface="Arial"/>
+              <a:buChar char="•"/>
+              <a:defRPr sz="2000" b="0" i="0" u="none" strike="noStrike" cap="none">
+                <a:solidFill>
+                  <a:schemeClr val="dk1"/>
+                </a:solidFill>
+                <a:latin typeface="Source Sans Pro"/>
+                <a:ea typeface="Source Sans Pro"/>
+                <a:cs typeface="Source Sans Pro"/>
+                <a:sym typeface="Source Sans Pro"/>
+              </a:defRPr>
+            </a:lvl7pPr>
+            <a:lvl8pPr marL="3429000" marR="0" lvl="7" indent="-101600" algn="l" rtl="0">
+              <a:spcBef>
+                <a:spcPts val="400"/>
+              </a:spcBef>
+              <a:buClr>
+                <a:schemeClr val="dk1"/>
+              </a:buClr>
+              <a:buSzPct val="100000"/>
+              <a:buFont typeface="Arial"/>
+              <a:buChar char="•"/>
+              <a:defRPr sz="2000" b="0" i="0" u="none" strike="noStrike" cap="none">
+                <a:solidFill>
+                  <a:schemeClr val="dk1"/>
+                </a:solidFill>
+                <a:latin typeface="Source Sans Pro"/>
+                <a:ea typeface="Source Sans Pro"/>
+                <a:cs typeface="Source Sans Pro"/>
+                <a:sym typeface="Source Sans Pro"/>
+              </a:defRPr>
+            </a:lvl8pPr>
+            <a:lvl9pPr marL="3886200" marR="0" lvl="8" indent="-101600" algn="l" rtl="0">
+              <a:spcBef>
+                <a:spcPts val="400"/>
+              </a:spcBef>
+              <a:buClr>
+                <a:schemeClr val="dk1"/>
+              </a:buClr>
+              <a:buSzPct val="100000"/>
+              <a:buFont typeface="Arial"/>
+              <a:buChar char="•"/>
+              <a:defRPr sz="2000" b="0" i="0" u="none" strike="noStrike" cap="none">
+                <a:solidFill>
+                  <a:schemeClr val="dk1"/>
+                </a:solidFill>
+                <a:latin typeface="Source Sans Pro"/>
+                <a:ea typeface="Source Sans Pro"/>
+                <a:cs typeface="Source Sans Pro"/>
+                <a:sym typeface="Source Sans Pro"/>
+              </a:defRPr>
+            </a:lvl9pPr>
+          </a:lstStyle>
+          <a:p>
+            <a:endParaRPr/>
+          </a:p>
+        </p:txBody>
+      </p:sp>
+      <p:sp>
+        <p:nvSpPr>
+          <p:cNvPr id="256" name="Shape 256"/>
+          <p:cNvSpPr txBox="1"/>
+          <p:nvPr/>
+        </p:nvSpPr>
+        <p:spPr>
+          <a:xfrm>
+            <a:off x="543446" y="4615300"/>
+            <a:ext cx="1094400" cy="413400"/>
+          </a:xfrm>
+          <a:prstGeom prst="rect">
+            <a:avLst/>
+          </a:prstGeom>
+          <a:noFill/>
+          <a:ln>
+            <a:noFill/>
+          </a:ln>
+        </p:spPr>
+        <p:txBody>
+          <a:bodyPr wrap="square" lIns="91425" tIns="91425" rIns="91425" bIns="91425" anchor="t" anchorCtr="0">
+            <a:noAutofit/>
+          </a:bodyPr>
+          <a:lstStyle/>
+          <a:p>
+            <a:pPr lvl="0" rtl="0">
+              <a:spcBef>
+                <a:spcPts val="0"/>
+              </a:spcBef>
+              <a:buNone/>
+            </a:pPr>
+            <a:r>
+              <a:rPr lang="en-US">
+                <a:solidFill>
+                  <a:srgbClr val="FFFFFF"/>
+                </a:solidFill>
+                <a:latin typeface="Roboto"/>
+                <a:ea typeface="Roboto"/>
+                <a:cs typeface="Roboto"/>
+                <a:sym typeface="Roboto"/>
+              </a:rPr>
+              <a:t>Concourse</a:t>
+            </a:r>
+          </a:p>
+        </p:txBody>
+      </p:sp>
+      <p:pic>
+        <p:nvPicPr>
+          <p:cNvPr id="257" name="Shape 257" descr="concourse-logo-white.png"/>
+          <p:cNvPicPr preferRelativeResize="0"/>
+          <p:nvPr/>
+        </p:nvPicPr>
+        <p:blipFill>
+          <a:blip r:embed="rId3">
+            <a:alphaModFix/>
+          </a:blip>
+          <a:stretch>
+            <a:fillRect/>
+          </a:stretch>
+        </p:blipFill>
+        <p:spPr>
+          <a:xfrm>
+            <a:off x="61232" y="4589962"/>
+            <a:ext cx="457199" cy="451576"/>
+          </a:xfrm>
+          <a:prstGeom prst="rect">
+            <a:avLst/>
+          </a:prstGeom>
+          <a:noFill/>
+          <a:ln>
+            <a:noFill/>
+          </a:ln>
+        </p:spPr>
+      </p:pic>
+    </p:spTree>
+    <p:extLst>
+      <p:ext uri="{BB962C8B-B14F-4D97-AF65-F5344CB8AC3E}">
+        <p14:creationId xmlns:p14="http://schemas.microsoft.com/office/powerpoint/2010/main" val="2141458924"/>
+      </p:ext>
+    </p:extLst>
+  </p:cSld>
+  <p:clrMapOvr>
+    <a:masterClrMapping/>
+  </p:clrMapOvr>
 </p:sldLayout>
 </file>
 
@@ -6156,7 +6955,7 @@
           <p:nvPr/>
         </p:nvPicPr>
         <p:blipFill>
-          <a:blip r:embed="rId11">
+          <a:blip r:embed="rId12">
             <a:extLst>
               <a:ext uri="{28A0092B-C50C-407E-A947-70E740481C1C}">
                 <a14:useLocalDpi xmlns:a14="http://schemas.microsoft.com/office/drawing/2010/main" val="0"/>
@@ -6195,6 +6994,7 @@
     <p:sldLayoutId id="2147484164" r:id="rId7"/>
     <p:sldLayoutId id="2147484169" r:id="rId8"/>
     <p:sldLayoutId id="2147484170" r:id="rId9"/>
+    <p:sldLayoutId id="2147484171" r:id="rId10"/>
   </p:sldLayoutIdLst>
   <p:timing>
     <p:tnLst>
@@ -6672,7 +7472,7 @@
               </a:spcAft>
             </a:pPr>
             <a:r>
-              <a:rPr lang="en-US" sz="2800" spc="-100" smtClean="0">
+              <a:rPr lang="en-US" sz="2800" spc="-100" dirty="0" smtClean="0">
                 <a:solidFill>
                   <a:schemeClr val="bg1"/>
                 </a:solidFill>
@@ -6685,21 +7485,8 @@
                 </a:effectLst>
                 <a:cs typeface="Arial"/>
               </a:rPr>
-              <a:t>Introducing Continuous Integrat</a:t>
-            </a:r>
-            <a:endParaRPr lang="en-US" sz="2800" spc="-100" dirty="0" smtClean="0">
-              <a:solidFill>
-                <a:schemeClr val="bg1"/>
-              </a:solidFill>
-              <a:effectLst>
-                <a:outerShdw blurRad="50800" dist="38100" dir="5400000" algn="t" rotWithShape="0">
-                  <a:prstClr val="black">
-                    <a:alpha val="40000"/>
-                  </a:prstClr>
-                </a:outerShdw>
-              </a:effectLst>
-              <a:cs typeface="Arial"/>
-            </a:endParaRPr>
+              <a:t>Introducing CI/CD</a:t>
+            </a:r>
           </a:p>
         </p:txBody>
       </p:sp>
@@ -6752,6 +7539,71 @@
   <p:cSld>
     <p:spTree>
       <p:nvGrpSpPr>
+        <p:cNvPr id="1" name="Shape 457"/>
+        <p:cNvGrpSpPr/>
+        <p:nvPr/>
+      </p:nvGrpSpPr>
+      <p:grpSpPr>
+        <a:xfrm>
+          <a:off x="0" y="0"/>
+          <a:ext cx="0" cy="0"/>
+          <a:chOff x="0" y="0"/>
+          <a:chExt cx="0" cy="0"/>
+        </a:xfrm>
+      </p:grpSpPr>
+      <p:pic>
+        <p:nvPicPr>
+          <p:cNvPr id="458" name="Shape 458" descr="Screen Shot 2016-01-15 at 5.11.57 PM.png"/>
+          <p:cNvPicPr preferRelativeResize="0"/>
+          <p:nvPr/>
+        </p:nvPicPr>
+        <p:blipFill>
+          <a:blip r:embed="rId3">
+            <a:alphaModFix/>
+          </a:blip>
+          <a:stretch>
+            <a:fillRect/>
+          </a:stretch>
+        </p:blipFill>
+        <p:spPr>
+          <a:xfrm>
+            <a:off x="0" y="0"/>
+            <a:ext cx="9144001" cy="5143500"/>
+          </a:xfrm>
+          <a:prstGeom prst="rect">
+            <a:avLst/>
+          </a:prstGeom>
+          <a:noFill/>
+          <a:ln>
+            <a:noFill/>
+          </a:ln>
+        </p:spPr>
+      </p:pic>
+    </p:spTree>
+    <p:extLst>
+      <p:ext uri="{BB962C8B-B14F-4D97-AF65-F5344CB8AC3E}">
+        <p14:creationId xmlns:p14="http://schemas.microsoft.com/office/powerpoint/2010/main" val="4290467831"/>
+      </p:ext>
+    </p:extLst>
+  </p:cSld>
+  <p:clrMapOvr>
+    <a:masterClrMapping/>
+  </p:clrMapOvr>
+  <p:timing>
+    <p:tnLst>
+      <p:par>
+        <p:cTn xmlns:p14="http://schemas.microsoft.com/office/powerpoint/2010/main" id="1" dur="indefinite" restart="never" nodeType="tmRoot"/>
+      </p:par>
+    </p:tnLst>
+  </p:timing>
+</p:sld>
+</file>
+
+<file path=ppt/slides/slide11.xml><?xml version="1.0" encoding="utf-8"?>
+<p:sld xmlns:a="http://schemas.openxmlformats.org/drawingml/2006/main" xmlns:r="http://schemas.openxmlformats.org/officeDocument/2006/relationships" xmlns:p="http://schemas.openxmlformats.org/presentationml/2006/main">
+  <p:cSld>
+    <p:spTree>
+      <p:nvGrpSpPr>
         <p:cNvPr id="1" name=""/>
         <p:cNvGrpSpPr/>
         <p:nvPr/>
@@ -6789,6 +7641,47 @@
           </a:bodyPr>
           <a:lstStyle/>
           <a:p>
+            <a:pPr lvl="0">
+              <a:spcBef>
+                <a:spcPts val="1300"/>
+              </a:spcBef>
+              <a:buClr>
+                <a:schemeClr val="dk1"/>
+              </a:buClr>
+              <a:buSzPct val="25000"/>
+            </a:pPr>
+            <a:r>
+              <a:rPr lang="en-US" b="1" u="sng" dirty="0">
+                <a:solidFill>
+                  <a:srgbClr val="FFFFFF"/>
+                </a:solidFill>
+                <a:latin typeface="Proxima Nova"/>
+                <a:cs typeface="Proxima Nova"/>
+                <a:hlinkClick r:id="rId3"/>
+              </a:rPr>
+              <a:t>Continuous Deployment From GitHub To PWS Via </a:t>
+            </a:r>
+            <a:r>
+              <a:rPr lang="en-US" b="1" u="sng" dirty="0" smtClean="0">
+                <a:solidFill>
+                  <a:srgbClr val="FFFFFF"/>
+                </a:solidFill>
+                <a:latin typeface="Proxima Nova"/>
+                <a:cs typeface="Proxima Nova"/>
+                <a:hlinkClick r:id="rId3"/>
+              </a:rPr>
+              <a:t>Concourse</a:t>
+            </a:r>
+            <a:endParaRPr lang="en-US" sz="1800" b="1" u="sng" dirty="0" smtClean="0">
+              <a:solidFill>
+                <a:srgbClr val="FFFFFF"/>
+              </a:solidFill>
+              <a:latin typeface="Proxima Nova"/>
+              <a:cs typeface="Proxima Nova"/>
+              <a:hlinkClick r:id="rId4"/>
+            </a:endParaRPr>
+          </a:p>
+          <a:p>
             <a:pPr lvl="0" rtl="0">
               <a:spcBef>
                 <a:spcPts val="1300"/>
@@ -6801,39 +7694,26 @@
               <a:buNone/>
             </a:pPr>
             <a:r>
+              <a:rPr lang="en-US" sz="1800" b="1" u="sng" dirty="0" smtClean="0">
+                <a:solidFill>
+                  <a:srgbClr val="FFFFFF"/>
+                </a:solidFill>
+                <a:latin typeface="Proxima Nova"/>
+                <a:cs typeface="Proxima Nova"/>
+                <a:hlinkClick r:id="rId4"/>
+              </a:rPr>
+              <a:t>Concourse </a:t>
+            </a:r>
+            <a:r>
               <a:rPr lang="en-US" sz="1800" b="1" u="sng" dirty="0">
                 <a:solidFill>
                   <a:srgbClr val="FFFFFF"/>
                 </a:solidFill>
                 <a:latin typeface="Proxima Nova"/>
                 <a:cs typeface="Proxima Nova"/>
-                <a:hlinkClick r:id="rId3"/>
-              </a:rPr>
-              <a:t>Continuous Deployment From GitHub To PWS Via Concourse</a:t>
-            </a:r>
-          </a:p>
-          <a:p>
-            <a:pPr lvl="0" rtl="0">
-              <a:spcBef>
-                <a:spcPts val="1300"/>
-              </a:spcBef>
-              <a:buClr>
-                <a:schemeClr val="dk1"/>
-              </a:buClr>
-              <a:buSzPct val="25000"/>
-              <a:buFont typeface="Arial"/>
-              <a:buNone/>
-            </a:pPr>
-            <a:r>
-              <a:rPr lang="en-US" sz="1800" b="1" u="sng" dirty="0">
-                <a:solidFill>
-                  <a:srgbClr val="FFFFFF"/>
-                </a:solidFill>
-                <a:latin typeface="Proxima Nova"/>
-                <a:cs typeface="Proxima Nova"/>
                 <a:hlinkClick r:id="rId4"/>
               </a:rPr>
-              <a:t>Concourse Documentation</a:t>
+              <a:t>Documentation</a:t>
             </a:r>
           </a:p>
           <a:p>
@@ -6985,113 +7865,6 @@
       </p:par>
     </p:tnLst>
   </p:timing>
-</p:sld>
-</file>
-
-<file path=ppt/slides/slide11.xml><?xml version="1.0" encoding="utf-8"?>
-<p:sld xmlns:a="http://schemas.openxmlformats.org/drawingml/2006/main" xmlns:r="http://schemas.openxmlformats.org/officeDocument/2006/relationships" xmlns:p="http://schemas.openxmlformats.org/presentationml/2006/main">
-  <p:cSld>
-    <p:spTree>
-      <p:nvGrpSpPr>
-        <p:cNvPr id="1" name=""/>
-        <p:cNvGrpSpPr/>
-        <p:nvPr/>
-      </p:nvGrpSpPr>
-      <p:grpSpPr>
-        <a:xfrm>
-          <a:off x="0" y="0"/>
-          <a:ext cx="0" cy="0"/>
-          <a:chOff x="0" y="0"/>
-          <a:chExt cx="0" cy="0"/>
-        </a:xfrm>
-      </p:grpSpPr>
-      <p:sp>
-        <p:nvSpPr>
-          <p:cNvPr id="2" name="Title 1"/>
-          <p:cNvSpPr>
-            <a:spLocks noGrp="1"/>
-          </p:cNvSpPr>
-          <p:nvPr>
-            <p:ph type="title"/>
-          </p:nvPr>
-        </p:nvSpPr>
-        <p:spPr/>
-        <p:txBody>
-          <a:bodyPr/>
-          <a:lstStyle/>
-          <a:p>
-            <a:r>
-              <a:rPr lang="en-US" dirty="0" smtClean="0"/>
-              <a:t>Spring Cloud Pipelines</a:t>
-            </a:r>
-            <a:endParaRPr lang="en-US" dirty="0"/>
-          </a:p>
-        </p:txBody>
-      </p:sp>
-      <p:sp>
-        <p:nvSpPr>
-          <p:cNvPr id="3" name="Content Placeholder 2"/>
-          <p:cNvSpPr>
-            <a:spLocks noGrp="1"/>
-          </p:cNvSpPr>
-          <p:nvPr>
-            <p:ph sz="quarter" idx="10"/>
-          </p:nvPr>
-        </p:nvSpPr>
-        <p:spPr>
-          <a:xfrm>
-            <a:off x="298834" y="1108074"/>
-            <a:ext cx="8845165" cy="3082925"/>
-          </a:xfrm>
-        </p:spPr>
-        <p:txBody>
-          <a:bodyPr/>
-          <a:lstStyle/>
-          <a:p>
-            <a:r>
-              <a:rPr lang="en-US" sz="2000" dirty="0" smtClean="0"/>
-              <a:t>Opinionated deployment pipeline template</a:t>
-            </a:r>
-          </a:p>
-          <a:p>
-            <a:r>
-              <a:rPr lang="en-US" sz="2000" dirty="0" smtClean="0"/>
-              <a:t>Based on good </a:t>
-            </a:r>
-            <a:r>
-              <a:rPr lang="en-US" sz="2000" dirty="0"/>
-              <a:t>practices from different projects</a:t>
-            </a:r>
-          </a:p>
-          <a:p>
-            <a:r>
-              <a:rPr lang="en-US" sz="2000" dirty="0" smtClean="0"/>
-              <a:t>“</a:t>
-            </a:r>
-            <a:r>
-              <a:rPr lang="en-US" sz="2000" dirty="0"/>
-              <a:t>Infrastructure as Code” approach</a:t>
-            </a:r>
-          </a:p>
-          <a:p>
-            <a:r>
-              <a:rPr lang="en-US" sz="2000" dirty="0" smtClean="0"/>
-              <a:t>No clicking around to create jobs</a:t>
-            </a:r>
-            <a:endParaRPr lang="en-US" sz="2000" dirty="0"/>
-          </a:p>
-        </p:txBody>
-      </p:sp>
-    </p:spTree>
-    <p:extLst>
-      <p:ext uri="{BB962C8B-B14F-4D97-AF65-F5344CB8AC3E}">
-        <p14:creationId xmlns:p14="http://schemas.microsoft.com/office/powerpoint/2010/main" val="2479789610"/>
-      </p:ext>
-    </p:extLst>
-  </p:cSld>
-  <p:clrMapOvr>
-    <a:masterClrMapping/>
-  </p:clrMapOvr>
 </p:sld>
 </file>
 
@@ -7157,6 +7930,120 @@
           <a:p>
             <a:r>
               <a:rPr lang="en-US" sz="2000" dirty="0" smtClean="0"/>
+              <a:t>Opinionated deployment pipeline template</a:t>
+            </a:r>
+          </a:p>
+          <a:p>
+            <a:r>
+              <a:rPr lang="en-US" sz="2000" dirty="0" smtClean="0"/>
+              <a:t>Based on good </a:t>
+            </a:r>
+            <a:r>
+              <a:rPr lang="en-US" sz="2000" dirty="0"/>
+              <a:t>practices from different projects</a:t>
+            </a:r>
+          </a:p>
+          <a:p>
+            <a:r>
+              <a:rPr lang="en-US" sz="2000" dirty="0" smtClean="0"/>
+              <a:t>“</a:t>
+            </a:r>
+            <a:r>
+              <a:rPr lang="en-US" sz="2000" dirty="0"/>
+              <a:t>Infrastructure as Code” approach</a:t>
+            </a:r>
+          </a:p>
+          <a:p>
+            <a:r>
+              <a:rPr lang="en-US" sz="2000" dirty="0" smtClean="0"/>
+              <a:t>No clicking around to create jobs</a:t>
+            </a:r>
+            <a:endParaRPr lang="en-US" sz="2000" dirty="0"/>
+          </a:p>
+        </p:txBody>
+      </p:sp>
+    </p:spTree>
+    <p:extLst>
+      <p:ext uri="{BB962C8B-B14F-4D97-AF65-F5344CB8AC3E}">
+        <p14:creationId xmlns:p14="http://schemas.microsoft.com/office/powerpoint/2010/main" val="2479789610"/>
+      </p:ext>
+    </p:extLst>
+  </p:cSld>
+  <p:clrMapOvr>
+    <a:masterClrMapping/>
+  </p:clrMapOvr>
+  <p:timing>
+    <p:tnLst>
+      <p:par>
+        <p:cTn xmlns:p14="http://schemas.microsoft.com/office/powerpoint/2010/main" id="1" dur="indefinite" restart="never" nodeType="tmRoot"/>
+      </p:par>
+    </p:tnLst>
+  </p:timing>
+</p:sld>
+</file>
+
+<file path=ppt/slides/slide13.xml><?xml version="1.0" encoding="utf-8"?>
+<p:sld xmlns:a="http://schemas.openxmlformats.org/drawingml/2006/main" xmlns:r="http://schemas.openxmlformats.org/officeDocument/2006/relationships" xmlns:p="http://schemas.openxmlformats.org/presentationml/2006/main">
+  <p:cSld>
+    <p:spTree>
+      <p:nvGrpSpPr>
+        <p:cNvPr id="1" name=""/>
+        <p:cNvGrpSpPr/>
+        <p:nvPr/>
+      </p:nvGrpSpPr>
+      <p:grpSpPr>
+        <a:xfrm>
+          <a:off x="0" y="0"/>
+          <a:ext cx="0" cy="0"/>
+          <a:chOff x="0" y="0"/>
+          <a:chExt cx="0" cy="0"/>
+        </a:xfrm>
+      </p:grpSpPr>
+      <p:sp>
+        <p:nvSpPr>
+          <p:cNvPr id="2" name="Title 1"/>
+          <p:cNvSpPr>
+            <a:spLocks noGrp="1"/>
+          </p:cNvSpPr>
+          <p:nvPr>
+            <p:ph type="title"/>
+          </p:nvPr>
+        </p:nvSpPr>
+        <p:spPr/>
+        <p:txBody>
+          <a:bodyPr/>
+          <a:lstStyle/>
+          <a:p>
+            <a:r>
+              <a:rPr lang="en-US" dirty="0" smtClean="0"/>
+              <a:t>Spring Cloud Pipelines</a:t>
+            </a:r>
+            <a:endParaRPr lang="en-US" dirty="0"/>
+          </a:p>
+        </p:txBody>
+      </p:sp>
+      <p:sp>
+        <p:nvSpPr>
+          <p:cNvPr id="3" name="Content Placeholder 2"/>
+          <p:cNvSpPr>
+            <a:spLocks noGrp="1"/>
+          </p:cNvSpPr>
+          <p:nvPr>
+            <p:ph sz="quarter" idx="10"/>
+          </p:nvPr>
+        </p:nvSpPr>
+        <p:spPr>
+          <a:xfrm>
+            <a:off x="298834" y="1108074"/>
+            <a:ext cx="8845165" cy="3082925"/>
+          </a:xfrm>
+        </p:spPr>
+        <p:txBody>
+          <a:bodyPr/>
+          <a:lstStyle/>
+          <a:p>
+            <a:r>
+              <a:rPr lang="en-US" sz="2000" dirty="0" smtClean="0"/>
               <a:t>Automation server support:</a:t>
             </a:r>
           </a:p>
@@ -7223,7 +8110,7 @@
 </p:sld>
 </file>
 
-<file path=ppt/slides/slide13.xml><?xml version="1.0" encoding="utf-8"?>
+<file path=ppt/slides/slide14.xml><?xml version="1.0" encoding="utf-8"?>
 <p:sld xmlns:a="http://schemas.openxmlformats.org/drawingml/2006/main" xmlns:r="http://schemas.openxmlformats.org/officeDocument/2006/relationships" xmlns:p="http://schemas.openxmlformats.org/presentationml/2006/main">
   <p:cSld>
     <p:spTree>
@@ -7313,7 +8200,7 @@
 </p:sld>
 </file>
 
-<file path=ppt/slides/slide14.xml><?xml version="1.0" encoding="utf-8"?>
+<file path=ppt/slides/slide15.xml><?xml version="1.0" encoding="utf-8"?>
 <p:sld xmlns:a="http://schemas.openxmlformats.org/drawingml/2006/main" xmlns:r="http://schemas.openxmlformats.org/officeDocument/2006/relationships" xmlns:p="http://schemas.openxmlformats.org/presentationml/2006/main">
   <p:cSld>
     <p:spTree>
@@ -7432,85 +8319,6 @@
 </p:sld>
 </file>
 
-<file path=ppt/slides/slide15.xml><?xml version="1.0" encoding="utf-8"?>
-<p:sld xmlns:a="http://schemas.openxmlformats.org/drawingml/2006/main" xmlns:r="http://schemas.openxmlformats.org/officeDocument/2006/relationships" xmlns:p="http://schemas.openxmlformats.org/presentationml/2006/main">
-  <p:cSld>
-    <p:spTree>
-      <p:nvGrpSpPr>
-        <p:cNvPr id="1" name=""/>
-        <p:cNvGrpSpPr/>
-        <p:nvPr/>
-      </p:nvGrpSpPr>
-      <p:grpSpPr>
-        <a:xfrm>
-          <a:off x="0" y="0"/>
-          <a:ext cx="0" cy="0"/>
-          <a:chOff x="0" y="0"/>
-          <a:chExt cx="0" cy="0"/>
-        </a:xfrm>
-      </p:grpSpPr>
-      <p:sp>
-        <p:nvSpPr>
-          <p:cNvPr id="2" name="Title 1"/>
-          <p:cNvSpPr>
-            <a:spLocks noGrp="1"/>
-          </p:cNvSpPr>
-          <p:nvPr>
-            <p:ph type="title"/>
-          </p:nvPr>
-        </p:nvSpPr>
-        <p:spPr/>
-        <p:txBody>
-          <a:bodyPr/>
-          <a:lstStyle/>
-          <a:p>
-            <a:r>
-              <a:rPr lang="en-US" dirty="0" smtClean="0"/>
-              <a:t>Spring Cloud Pipelines</a:t>
-            </a:r>
-            <a:endParaRPr lang="en-US" dirty="0"/>
-          </a:p>
-        </p:txBody>
-      </p:sp>
-      <p:sp>
-        <p:nvSpPr>
-          <p:cNvPr id="3" name="Content Placeholder 2"/>
-          <p:cNvSpPr>
-            <a:spLocks noGrp="1"/>
-          </p:cNvSpPr>
-          <p:nvPr>
-            <p:ph sz="quarter" idx="10"/>
-          </p:nvPr>
-        </p:nvSpPr>
-        <p:spPr/>
-        <p:txBody>
-          <a:bodyPr anchor="ctr"/>
-          <a:lstStyle/>
-          <a:p>
-            <a:pPr marL="0" indent="0" algn="ctr">
-              <a:buNone/>
-            </a:pPr>
-            <a:r>
-              <a:rPr lang="en-US" dirty="0" smtClean="0"/>
-              <a:t>Demo</a:t>
-            </a:r>
-            <a:endParaRPr lang="en-US" dirty="0"/>
-          </a:p>
-        </p:txBody>
-      </p:sp>
-    </p:spTree>
-    <p:extLst>
-      <p:ext uri="{BB962C8B-B14F-4D97-AF65-F5344CB8AC3E}">
-        <p14:creationId xmlns:p14="http://schemas.microsoft.com/office/powerpoint/2010/main" val="3770463223"/>
-      </p:ext>
-    </p:extLst>
-  </p:cSld>
-  <p:clrMapOvr>
-    <a:masterClrMapping/>
-  </p:clrMapOvr>
-</p:sld>
-</file>
-
 <file path=ppt/slides/slide16.xml><?xml version="1.0" encoding="utf-8"?>
 <p:sld xmlns:a="http://schemas.openxmlformats.org/drawingml/2006/main" xmlns:r="http://schemas.openxmlformats.org/officeDocument/2006/relationships" xmlns:p="http://schemas.openxmlformats.org/presentationml/2006/main">
   <p:cSld>
@@ -7545,6 +8353,85 @@
           <a:p>
             <a:r>
               <a:rPr lang="en-US" dirty="0" smtClean="0"/>
+              <a:t>Spring Cloud Pipelines</a:t>
+            </a:r>
+            <a:endParaRPr lang="en-US" dirty="0"/>
+          </a:p>
+        </p:txBody>
+      </p:sp>
+      <p:sp>
+        <p:nvSpPr>
+          <p:cNvPr id="3" name="Content Placeholder 2"/>
+          <p:cNvSpPr>
+            <a:spLocks noGrp="1"/>
+          </p:cNvSpPr>
+          <p:nvPr>
+            <p:ph sz="quarter" idx="10"/>
+          </p:nvPr>
+        </p:nvSpPr>
+        <p:spPr/>
+        <p:txBody>
+          <a:bodyPr anchor="ctr"/>
+          <a:lstStyle/>
+          <a:p>
+            <a:pPr marL="0" indent="0" algn="ctr">
+              <a:buNone/>
+            </a:pPr>
+            <a:r>
+              <a:rPr lang="en-US" dirty="0" smtClean="0"/>
+              <a:t>Demo</a:t>
+            </a:r>
+            <a:endParaRPr lang="en-US" dirty="0"/>
+          </a:p>
+        </p:txBody>
+      </p:sp>
+    </p:spTree>
+    <p:extLst>
+      <p:ext uri="{BB962C8B-B14F-4D97-AF65-F5344CB8AC3E}">
+        <p14:creationId xmlns:p14="http://schemas.microsoft.com/office/powerpoint/2010/main" val="3770463223"/>
+      </p:ext>
+    </p:extLst>
+  </p:cSld>
+  <p:clrMapOvr>
+    <a:masterClrMapping/>
+  </p:clrMapOvr>
+</p:sld>
+</file>
+
+<file path=ppt/slides/slide17.xml><?xml version="1.0" encoding="utf-8"?>
+<p:sld xmlns:a="http://schemas.openxmlformats.org/drawingml/2006/main" xmlns:r="http://schemas.openxmlformats.org/officeDocument/2006/relationships" xmlns:p="http://schemas.openxmlformats.org/presentationml/2006/main">
+  <p:cSld>
+    <p:spTree>
+      <p:nvGrpSpPr>
+        <p:cNvPr id="1" name=""/>
+        <p:cNvGrpSpPr/>
+        <p:nvPr/>
+      </p:nvGrpSpPr>
+      <p:grpSpPr>
+        <a:xfrm>
+          <a:off x="0" y="0"/>
+          <a:ext cx="0" cy="0"/>
+          <a:chOff x="0" y="0"/>
+          <a:chExt cx="0" cy="0"/>
+        </a:xfrm>
+      </p:grpSpPr>
+      <p:sp>
+        <p:nvSpPr>
+          <p:cNvPr id="2" name="Title 1"/>
+          <p:cNvSpPr>
+            <a:spLocks noGrp="1"/>
+          </p:cNvSpPr>
+          <p:nvPr>
+            <p:ph type="title"/>
+          </p:nvPr>
+        </p:nvSpPr>
+        <p:spPr/>
+        <p:txBody>
+          <a:bodyPr/>
+          <a:lstStyle/>
+          <a:p>
+            <a:r>
+              <a:rPr lang="en-US" dirty="0" smtClean="0"/>
               <a:t>Spring Cloud Pipelines - Summary</a:t>
             </a:r>
             <a:endParaRPr lang="en-US" dirty="0"/>
@@ -7675,7 +8562,7 @@
 </p:sld>
 </file>
 
-<file path=ppt/slides/slide17.xml><?xml version="1.0" encoding="utf-8"?>
+<file path=ppt/slides/slide18.xml><?xml version="1.0" encoding="utf-8"?>
 <p:sld xmlns:a="http://schemas.openxmlformats.org/drawingml/2006/main" xmlns:r="http://schemas.openxmlformats.org/officeDocument/2006/relationships" xmlns:p="http://schemas.openxmlformats.org/presentationml/2006/main">
   <p:cSld>
     <p:spTree>
@@ -7853,7 +8740,7 @@
 </p:sld>
 </file>
 
-<file path=ppt/slides/slide18.xml><?xml version="1.0" encoding="utf-8"?>
+<file path=ppt/slides/slide19.xml><?xml version="1.0" encoding="utf-8"?>
 <p:sld xmlns:a="http://schemas.openxmlformats.org/drawingml/2006/main" xmlns:r="http://schemas.openxmlformats.org/officeDocument/2006/relationships" xmlns:p="http://schemas.openxmlformats.org/presentationml/2006/main">
   <p:cSld>
     <p:spTree>
@@ -8025,434 +8912,6 @@
     <p:extLst>
       <p:ext uri="{BB962C8B-B14F-4D97-AF65-F5344CB8AC3E}">
         <p14:creationId xmlns:p14="http://schemas.microsoft.com/office/powerpoint/2010/main" val="1190901981"/>
-      </p:ext>
-    </p:extLst>
-  </p:cSld>
-  <p:clrMapOvr>
-    <a:masterClrMapping/>
-  </p:clrMapOvr>
-  <p:timing>
-    <p:tnLst>
-      <p:par>
-        <p:cTn xmlns:p14="http://schemas.microsoft.com/office/powerpoint/2010/main" id="1" dur="indefinite" restart="never" nodeType="tmRoot"/>
-      </p:par>
-    </p:tnLst>
-  </p:timing>
-</p:sld>
-</file>
-
-<file path=ppt/slides/slide19.xml><?xml version="1.0" encoding="utf-8"?>
-<p:sld xmlns:a="http://schemas.openxmlformats.org/drawingml/2006/main" xmlns:r="http://schemas.openxmlformats.org/officeDocument/2006/relationships" xmlns:p="http://schemas.openxmlformats.org/presentationml/2006/main">
-  <p:cSld>
-    <p:spTree>
-      <p:nvGrpSpPr>
-        <p:cNvPr id="1" name=""/>
-        <p:cNvGrpSpPr/>
-        <p:nvPr/>
-      </p:nvGrpSpPr>
-      <p:grpSpPr>
-        <a:xfrm>
-          <a:off x="0" y="0"/>
-          <a:ext cx="0" cy="0"/>
-          <a:chOff x="0" y="0"/>
-          <a:chExt cx="0" cy="0"/>
-        </a:xfrm>
-      </p:grpSpPr>
-      <p:sp>
-        <p:nvSpPr>
-          <p:cNvPr id="8" name="Title 7"/>
-          <p:cNvSpPr>
-            <a:spLocks noGrp="1"/>
-          </p:cNvSpPr>
-          <p:nvPr>
-            <p:ph type="title"/>
-          </p:nvPr>
-        </p:nvSpPr>
-        <p:spPr>
-          <a:prstGeom prst="rect">
-            <a:avLst/>
-          </a:prstGeom>
-        </p:spPr>
-        <p:txBody>
-          <a:bodyPr/>
-          <a:lstStyle/>
-          <a:p>
-            <a:r>
-              <a:rPr lang="en-US" b="1" dirty="0" smtClean="0">
-                <a:solidFill>
-                  <a:srgbClr val="FFFFFF"/>
-                </a:solidFill>
-                <a:latin typeface="Proxima Nova"/>
-                <a:cs typeface="Proxima Nova"/>
-              </a:rPr>
-              <a:t>What is </a:t>
-            </a:r>
-            <a:r>
-              <a:rPr lang="en-US" b="1" dirty="0" err="1" smtClean="0">
-                <a:solidFill>
-                  <a:srgbClr val="FFFFFF"/>
-                </a:solidFill>
-                <a:latin typeface="Proxima Nova"/>
-                <a:cs typeface="Proxima Nova"/>
-              </a:rPr>
-              <a:t>GitLab</a:t>
-            </a:r>
-            <a:r>
-              <a:rPr lang="en-US" b="1" dirty="0" smtClean="0">
-                <a:solidFill>
-                  <a:srgbClr val="FFFFFF"/>
-                </a:solidFill>
-                <a:latin typeface="Proxima Nova"/>
-                <a:cs typeface="Proxima Nova"/>
-              </a:rPr>
-              <a:t>?</a:t>
-            </a:r>
-            <a:endParaRPr lang="en-US" b="1" dirty="0">
-              <a:solidFill>
-                <a:srgbClr val="FFFFFF"/>
-              </a:solidFill>
-              <a:latin typeface="Proxima Nova"/>
-              <a:cs typeface="Proxima Nova"/>
-            </a:endParaRPr>
-          </a:p>
-        </p:txBody>
-      </p:sp>
-      <p:sp>
-        <p:nvSpPr>
-          <p:cNvPr id="11" name="Shape 384"/>
-          <p:cNvSpPr txBox="1">
-            <a:spLocks/>
-          </p:cNvSpPr>
-          <p:nvPr/>
-        </p:nvSpPr>
-        <p:spPr>
-          <a:xfrm>
-            <a:off x="457200" y="1237085"/>
-            <a:ext cx="8229600" cy="3641998"/>
-          </a:xfrm>
-          <a:prstGeom prst="rect">
-            <a:avLst/>
-          </a:prstGeom>
-          <a:noFill/>
-          <a:ln>
-            <a:noFill/>
-          </a:ln>
-        </p:spPr>
-        <p:txBody>
-          <a:bodyPr lIns="91425" tIns="91425" rIns="91425" bIns="91425" anchor="t" anchorCtr="0">
-            <a:noAutofit/>
-          </a:bodyPr>
-          <a:lstStyle>
-            <a:lvl1pPr marL="342900" indent="-342900" algn="l" defTabSz="457200" rtl="0" eaLnBrk="1" latinLnBrk="0" hangingPunct="1">
-              <a:spcBef>
-                <a:spcPct val="20000"/>
-              </a:spcBef>
-              <a:buFont typeface="Arial"/>
-              <a:buChar char="•"/>
-              <a:defRPr sz="3200" kern="1200">
-                <a:solidFill>
-                  <a:schemeClr val="tx1"/>
-                </a:solidFill>
-                <a:latin typeface="+mn-lt"/>
-                <a:ea typeface="+mn-ea"/>
-                <a:cs typeface="+mn-cs"/>
-              </a:defRPr>
-            </a:lvl1pPr>
-            <a:lvl2pPr marL="742950" indent="-285750" algn="l" defTabSz="457200" rtl="0" eaLnBrk="1" latinLnBrk="0" hangingPunct="1">
-              <a:spcBef>
-                <a:spcPct val="20000"/>
-              </a:spcBef>
-              <a:buFont typeface="Arial"/>
-              <a:buChar char="–"/>
-              <a:defRPr sz="2800" kern="1200">
-                <a:solidFill>
-                  <a:schemeClr val="tx1"/>
-                </a:solidFill>
-                <a:latin typeface="+mn-lt"/>
-                <a:ea typeface="+mn-ea"/>
-                <a:cs typeface="+mn-cs"/>
-              </a:defRPr>
-            </a:lvl2pPr>
-            <a:lvl3pPr marL="1143000" indent="-228600" algn="l" defTabSz="457200" rtl="0" eaLnBrk="1" latinLnBrk="0" hangingPunct="1">
-              <a:spcBef>
-                <a:spcPct val="20000"/>
-              </a:spcBef>
-              <a:buFont typeface="Arial"/>
-              <a:buChar char="•"/>
-              <a:defRPr sz="2400" kern="1200">
-                <a:solidFill>
-                  <a:schemeClr val="tx1"/>
-                </a:solidFill>
-                <a:latin typeface="+mn-lt"/>
-                <a:ea typeface="+mn-ea"/>
-                <a:cs typeface="+mn-cs"/>
-              </a:defRPr>
-            </a:lvl3pPr>
-            <a:lvl4pPr marL="1600200" indent="-228600" algn="l" defTabSz="457200" rtl="0" eaLnBrk="1" latinLnBrk="0" hangingPunct="1">
-              <a:spcBef>
-                <a:spcPct val="20000"/>
-              </a:spcBef>
-              <a:buFont typeface="Arial"/>
-              <a:buChar char="–"/>
-              <a:defRPr sz="2000" kern="1200">
-                <a:solidFill>
-                  <a:schemeClr val="tx1"/>
-                </a:solidFill>
-                <a:latin typeface="+mn-lt"/>
-                <a:ea typeface="+mn-ea"/>
-                <a:cs typeface="+mn-cs"/>
-              </a:defRPr>
-            </a:lvl4pPr>
-            <a:lvl5pPr marL="2057400" indent="-228600" algn="l" defTabSz="457200" rtl="0" eaLnBrk="1" latinLnBrk="0" hangingPunct="1">
-              <a:spcBef>
-                <a:spcPct val="20000"/>
-              </a:spcBef>
-              <a:buFont typeface="Arial"/>
-              <a:buChar char="»"/>
-              <a:defRPr sz="2000" kern="1200">
-                <a:solidFill>
-                  <a:schemeClr val="tx1"/>
-                </a:solidFill>
-                <a:latin typeface="+mn-lt"/>
-                <a:ea typeface="+mn-ea"/>
-                <a:cs typeface="+mn-cs"/>
-              </a:defRPr>
-            </a:lvl5pPr>
-            <a:lvl6pPr marL="2514600" indent="-228600" algn="l" defTabSz="457200" rtl="0" eaLnBrk="1" latinLnBrk="0" hangingPunct="1">
-              <a:spcBef>
-                <a:spcPct val="20000"/>
-              </a:spcBef>
-              <a:buFont typeface="Arial"/>
-              <a:buChar char="•"/>
-              <a:defRPr sz="2000" kern="1200">
-                <a:solidFill>
-                  <a:schemeClr val="tx1"/>
-                </a:solidFill>
-                <a:latin typeface="+mn-lt"/>
-                <a:ea typeface="+mn-ea"/>
-                <a:cs typeface="+mn-cs"/>
-              </a:defRPr>
-            </a:lvl6pPr>
-            <a:lvl7pPr marL="2971800" indent="-228600" algn="l" defTabSz="457200" rtl="0" eaLnBrk="1" latinLnBrk="0" hangingPunct="1">
-              <a:spcBef>
-                <a:spcPct val="20000"/>
-              </a:spcBef>
-              <a:buFont typeface="Arial"/>
-              <a:buChar char="•"/>
-              <a:defRPr sz="2000" kern="1200">
-                <a:solidFill>
-                  <a:schemeClr val="tx1"/>
-                </a:solidFill>
-                <a:latin typeface="+mn-lt"/>
-                <a:ea typeface="+mn-ea"/>
-                <a:cs typeface="+mn-cs"/>
-              </a:defRPr>
-            </a:lvl7pPr>
-            <a:lvl8pPr marL="3429000" indent="-228600" algn="l" defTabSz="457200" rtl="0" eaLnBrk="1" latinLnBrk="0" hangingPunct="1">
-              <a:spcBef>
-                <a:spcPct val="20000"/>
-              </a:spcBef>
-              <a:buFont typeface="Arial"/>
-              <a:buChar char="•"/>
-              <a:defRPr sz="2000" kern="1200">
-                <a:solidFill>
-                  <a:schemeClr val="tx1"/>
-                </a:solidFill>
-                <a:latin typeface="+mn-lt"/>
-                <a:ea typeface="+mn-ea"/>
-                <a:cs typeface="+mn-cs"/>
-              </a:defRPr>
-            </a:lvl8pPr>
-            <a:lvl9pPr marL="3886200" indent="-228600" algn="l" defTabSz="457200" rtl="0" eaLnBrk="1" latinLnBrk="0" hangingPunct="1">
-              <a:spcBef>
-                <a:spcPct val="20000"/>
-              </a:spcBef>
-              <a:buFont typeface="Arial"/>
-              <a:buChar char="•"/>
-              <a:defRPr sz="2000" kern="1200">
-                <a:solidFill>
-                  <a:schemeClr val="tx1"/>
-                </a:solidFill>
-                <a:latin typeface="+mn-lt"/>
-                <a:ea typeface="+mn-ea"/>
-                <a:cs typeface="+mn-cs"/>
-              </a:defRPr>
-            </a:lvl9pPr>
-          </a:lstStyle>
-          <a:p>
-            <a:pPr marL="228600" indent="0">
-              <a:spcBef>
-                <a:spcPts val="0"/>
-              </a:spcBef>
-              <a:buClr>
-                <a:schemeClr val="tx1"/>
-              </a:buClr>
-              <a:buSzPct val="100000"/>
-              <a:buNone/>
-            </a:pPr>
-            <a:r>
-              <a:rPr lang="en-US" sz="2000" dirty="0" smtClean="0">
-                <a:solidFill>
-                  <a:srgbClr val="FFFFFF"/>
-                </a:solidFill>
-                <a:latin typeface="Proxima Nova"/>
-                <a:ea typeface="Source Sans Pro"/>
-                <a:cs typeface="Proxima Nova"/>
-                <a:sym typeface="Source Sans Pro"/>
-              </a:rPr>
-              <a:t>Source control product using </a:t>
-            </a:r>
-            <a:r>
-              <a:rPr lang="en-US" sz="2000" dirty="0" err="1" smtClean="0">
-                <a:solidFill>
-                  <a:srgbClr val="FFFFFF"/>
-                </a:solidFill>
-                <a:latin typeface="Proxima Nova"/>
-                <a:ea typeface="Source Sans Pro"/>
-                <a:cs typeface="Proxima Nova"/>
-                <a:sym typeface="Source Sans Pro"/>
-              </a:rPr>
-              <a:t>git</a:t>
-            </a:r>
-            <a:endParaRPr lang="en-US" sz="2000" dirty="0" smtClean="0">
-              <a:solidFill>
-                <a:srgbClr val="FFFFFF"/>
-              </a:solidFill>
-              <a:latin typeface="Proxima Nova"/>
-              <a:ea typeface="Source Sans Pro"/>
-              <a:cs typeface="Proxima Nova"/>
-              <a:sym typeface="Source Sans Pro"/>
-            </a:endParaRPr>
-          </a:p>
-          <a:p>
-            <a:pPr marL="0" indent="0">
-              <a:spcBef>
-                <a:spcPts val="0"/>
-              </a:spcBef>
-              <a:buClr>
-                <a:schemeClr val="tx1"/>
-              </a:buClr>
-              <a:buSzPct val="25000"/>
-              <a:buNone/>
-            </a:pPr>
-            <a:endParaRPr lang="en-US" sz="2000" dirty="0" smtClean="0">
-              <a:solidFill>
-                <a:srgbClr val="FFFFFF"/>
-              </a:solidFill>
-              <a:latin typeface="Proxima Nova"/>
-              <a:ea typeface="Source Sans Pro"/>
-              <a:cs typeface="Proxima Nova"/>
-              <a:sym typeface="Source Sans Pro"/>
-            </a:endParaRPr>
-          </a:p>
-          <a:p>
-            <a:pPr marL="228600" indent="0">
-              <a:spcBef>
-                <a:spcPts val="0"/>
-              </a:spcBef>
-              <a:buClr>
-                <a:schemeClr val="tx1"/>
-              </a:buClr>
-              <a:buSzPct val="100000"/>
-              <a:buNone/>
-            </a:pPr>
-            <a:r>
-              <a:rPr lang="en-US" sz="2000" dirty="0" smtClean="0">
-                <a:solidFill>
-                  <a:srgbClr val="FFFFFF"/>
-                </a:solidFill>
-                <a:latin typeface="Proxima Nova"/>
-                <a:ea typeface="Source Sans Pro"/>
-                <a:cs typeface="Proxima Nova"/>
-                <a:sym typeface="Source Sans Pro"/>
-              </a:rPr>
-              <a:t>Includes </a:t>
-            </a:r>
-            <a:r>
-              <a:rPr lang="en-US" sz="2000" dirty="0" err="1" smtClean="0">
-                <a:solidFill>
-                  <a:srgbClr val="FFFFFF"/>
-                </a:solidFill>
-                <a:latin typeface="Proxima Nova"/>
-                <a:ea typeface="Source Sans Pro"/>
-                <a:cs typeface="Proxima Nova"/>
-                <a:sym typeface="Source Sans Pro"/>
-              </a:rPr>
-              <a:t>git</a:t>
-            </a:r>
-            <a:r>
-              <a:rPr lang="en-US" sz="2000" dirty="0" smtClean="0">
-                <a:solidFill>
-                  <a:srgbClr val="FFFFFF"/>
-                </a:solidFill>
-                <a:latin typeface="Proxima Nova"/>
-                <a:ea typeface="Source Sans Pro"/>
-                <a:cs typeface="Proxima Nova"/>
-                <a:sym typeface="Source Sans Pro"/>
-              </a:rPr>
-              <a:t> repository management, code reviews, issue tracking, wikis and much more</a:t>
-            </a:r>
-          </a:p>
-          <a:p>
-            <a:pPr marL="0" indent="0">
-              <a:spcBef>
-                <a:spcPts val="0"/>
-              </a:spcBef>
-              <a:buClr>
-                <a:schemeClr val="tx1"/>
-              </a:buClr>
-              <a:buSzPct val="25000"/>
-              <a:buNone/>
-            </a:pPr>
-            <a:endParaRPr lang="en-US" sz="2000" dirty="0" smtClean="0">
-              <a:solidFill>
-                <a:srgbClr val="FFFFFF"/>
-              </a:solidFill>
-              <a:latin typeface="Proxima Nova"/>
-              <a:ea typeface="Source Sans Pro"/>
-              <a:cs typeface="Proxima Nova"/>
-              <a:sym typeface="Source Sans Pro"/>
-            </a:endParaRPr>
-          </a:p>
-          <a:p>
-            <a:pPr marL="228600" indent="0">
-              <a:spcBef>
-                <a:spcPts val="0"/>
-              </a:spcBef>
-              <a:buClr>
-                <a:schemeClr val="tx1"/>
-              </a:buClr>
-              <a:buSzPct val="100000"/>
-              <a:buNone/>
-            </a:pPr>
-            <a:r>
-              <a:rPr lang="en-US" sz="2000" dirty="0" smtClean="0">
-                <a:solidFill>
-                  <a:srgbClr val="FFFFFF"/>
-                </a:solidFill>
-                <a:latin typeface="Proxima Nova"/>
-                <a:ea typeface="Source Sans Pro"/>
-                <a:cs typeface="Proxima Nova"/>
-                <a:sym typeface="Source Sans Pro"/>
-              </a:rPr>
-              <a:t>Provides a managed solution, including automated deployment, configuration, scaling and upgrade</a:t>
-            </a:r>
-            <a:endParaRPr lang="en-US" sz="2000" dirty="0">
-              <a:solidFill>
-                <a:srgbClr val="FFFFFF"/>
-              </a:solidFill>
-              <a:latin typeface="Proxima Nova"/>
-              <a:ea typeface="Source Sans Pro"/>
-              <a:cs typeface="Proxima Nova"/>
-              <a:sym typeface="Source Sans Pro"/>
-            </a:endParaRPr>
-          </a:p>
-        </p:txBody>
-      </p:sp>
-    </p:spTree>
-    <p:extLst>
-      <p:ext uri="{BB962C8B-B14F-4D97-AF65-F5344CB8AC3E}">
-        <p14:creationId xmlns:p14="http://schemas.microsoft.com/office/powerpoint/2010/main" val="3928130125"/>
       </p:ext>
     </p:extLst>
   </p:cSld>
@@ -8577,6 +9036,434 @@
                 <a:latin typeface="Proxima Nova"/>
                 <a:cs typeface="Proxima Nova"/>
               </a:rPr>
+              <a:t>What is </a:t>
+            </a:r>
+            <a:r>
+              <a:rPr lang="en-US" b="1" dirty="0" err="1" smtClean="0">
+                <a:solidFill>
+                  <a:srgbClr val="FFFFFF"/>
+                </a:solidFill>
+                <a:latin typeface="Proxima Nova"/>
+                <a:cs typeface="Proxima Nova"/>
+              </a:rPr>
+              <a:t>GitLab</a:t>
+            </a:r>
+            <a:r>
+              <a:rPr lang="en-US" b="1" dirty="0" smtClean="0">
+                <a:solidFill>
+                  <a:srgbClr val="FFFFFF"/>
+                </a:solidFill>
+                <a:latin typeface="Proxima Nova"/>
+                <a:cs typeface="Proxima Nova"/>
+              </a:rPr>
+              <a:t>?</a:t>
+            </a:r>
+            <a:endParaRPr lang="en-US" b="1" dirty="0">
+              <a:solidFill>
+                <a:srgbClr val="FFFFFF"/>
+              </a:solidFill>
+              <a:latin typeface="Proxima Nova"/>
+              <a:cs typeface="Proxima Nova"/>
+            </a:endParaRPr>
+          </a:p>
+        </p:txBody>
+      </p:sp>
+      <p:sp>
+        <p:nvSpPr>
+          <p:cNvPr id="11" name="Shape 384"/>
+          <p:cNvSpPr txBox="1">
+            <a:spLocks/>
+          </p:cNvSpPr>
+          <p:nvPr/>
+        </p:nvSpPr>
+        <p:spPr>
+          <a:xfrm>
+            <a:off x="457200" y="1237085"/>
+            <a:ext cx="8229600" cy="3641998"/>
+          </a:xfrm>
+          <a:prstGeom prst="rect">
+            <a:avLst/>
+          </a:prstGeom>
+          <a:noFill/>
+          <a:ln>
+            <a:noFill/>
+          </a:ln>
+        </p:spPr>
+        <p:txBody>
+          <a:bodyPr lIns="91425" tIns="91425" rIns="91425" bIns="91425" anchor="t" anchorCtr="0">
+            <a:noAutofit/>
+          </a:bodyPr>
+          <a:lstStyle>
+            <a:lvl1pPr marL="342900" indent="-342900" algn="l" defTabSz="457200" rtl="0" eaLnBrk="1" latinLnBrk="0" hangingPunct="1">
+              <a:spcBef>
+                <a:spcPct val="20000"/>
+              </a:spcBef>
+              <a:buFont typeface="Arial"/>
+              <a:buChar char="•"/>
+              <a:defRPr sz="3200" kern="1200">
+                <a:solidFill>
+                  <a:schemeClr val="tx1"/>
+                </a:solidFill>
+                <a:latin typeface="+mn-lt"/>
+                <a:ea typeface="+mn-ea"/>
+                <a:cs typeface="+mn-cs"/>
+              </a:defRPr>
+            </a:lvl1pPr>
+            <a:lvl2pPr marL="742950" indent="-285750" algn="l" defTabSz="457200" rtl="0" eaLnBrk="1" latinLnBrk="0" hangingPunct="1">
+              <a:spcBef>
+                <a:spcPct val="20000"/>
+              </a:spcBef>
+              <a:buFont typeface="Arial"/>
+              <a:buChar char="–"/>
+              <a:defRPr sz="2800" kern="1200">
+                <a:solidFill>
+                  <a:schemeClr val="tx1"/>
+                </a:solidFill>
+                <a:latin typeface="+mn-lt"/>
+                <a:ea typeface="+mn-ea"/>
+                <a:cs typeface="+mn-cs"/>
+              </a:defRPr>
+            </a:lvl2pPr>
+            <a:lvl3pPr marL="1143000" indent="-228600" algn="l" defTabSz="457200" rtl="0" eaLnBrk="1" latinLnBrk="0" hangingPunct="1">
+              <a:spcBef>
+                <a:spcPct val="20000"/>
+              </a:spcBef>
+              <a:buFont typeface="Arial"/>
+              <a:buChar char="•"/>
+              <a:defRPr sz="2400" kern="1200">
+                <a:solidFill>
+                  <a:schemeClr val="tx1"/>
+                </a:solidFill>
+                <a:latin typeface="+mn-lt"/>
+                <a:ea typeface="+mn-ea"/>
+                <a:cs typeface="+mn-cs"/>
+              </a:defRPr>
+            </a:lvl3pPr>
+            <a:lvl4pPr marL="1600200" indent="-228600" algn="l" defTabSz="457200" rtl="0" eaLnBrk="1" latinLnBrk="0" hangingPunct="1">
+              <a:spcBef>
+                <a:spcPct val="20000"/>
+              </a:spcBef>
+              <a:buFont typeface="Arial"/>
+              <a:buChar char="–"/>
+              <a:defRPr sz="2000" kern="1200">
+                <a:solidFill>
+                  <a:schemeClr val="tx1"/>
+                </a:solidFill>
+                <a:latin typeface="+mn-lt"/>
+                <a:ea typeface="+mn-ea"/>
+                <a:cs typeface="+mn-cs"/>
+              </a:defRPr>
+            </a:lvl4pPr>
+            <a:lvl5pPr marL="2057400" indent="-228600" algn="l" defTabSz="457200" rtl="0" eaLnBrk="1" latinLnBrk="0" hangingPunct="1">
+              <a:spcBef>
+                <a:spcPct val="20000"/>
+              </a:spcBef>
+              <a:buFont typeface="Arial"/>
+              <a:buChar char="»"/>
+              <a:defRPr sz="2000" kern="1200">
+                <a:solidFill>
+                  <a:schemeClr val="tx1"/>
+                </a:solidFill>
+                <a:latin typeface="+mn-lt"/>
+                <a:ea typeface="+mn-ea"/>
+                <a:cs typeface="+mn-cs"/>
+              </a:defRPr>
+            </a:lvl5pPr>
+            <a:lvl6pPr marL="2514600" indent="-228600" algn="l" defTabSz="457200" rtl="0" eaLnBrk="1" latinLnBrk="0" hangingPunct="1">
+              <a:spcBef>
+                <a:spcPct val="20000"/>
+              </a:spcBef>
+              <a:buFont typeface="Arial"/>
+              <a:buChar char="•"/>
+              <a:defRPr sz="2000" kern="1200">
+                <a:solidFill>
+                  <a:schemeClr val="tx1"/>
+                </a:solidFill>
+                <a:latin typeface="+mn-lt"/>
+                <a:ea typeface="+mn-ea"/>
+                <a:cs typeface="+mn-cs"/>
+              </a:defRPr>
+            </a:lvl6pPr>
+            <a:lvl7pPr marL="2971800" indent="-228600" algn="l" defTabSz="457200" rtl="0" eaLnBrk="1" latinLnBrk="0" hangingPunct="1">
+              <a:spcBef>
+                <a:spcPct val="20000"/>
+              </a:spcBef>
+              <a:buFont typeface="Arial"/>
+              <a:buChar char="•"/>
+              <a:defRPr sz="2000" kern="1200">
+                <a:solidFill>
+                  <a:schemeClr val="tx1"/>
+                </a:solidFill>
+                <a:latin typeface="+mn-lt"/>
+                <a:ea typeface="+mn-ea"/>
+                <a:cs typeface="+mn-cs"/>
+              </a:defRPr>
+            </a:lvl7pPr>
+            <a:lvl8pPr marL="3429000" indent="-228600" algn="l" defTabSz="457200" rtl="0" eaLnBrk="1" latinLnBrk="0" hangingPunct="1">
+              <a:spcBef>
+                <a:spcPct val="20000"/>
+              </a:spcBef>
+              <a:buFont typeface="Arial"/>
+              <a:buChar char="•"/>
+              <a:defRPr sz="2000" kern="1200">
+                <a:solidFill>
+                  <a:schemeClr val="tx1"/>
+                </a:solidFill>
+                <a:latin typeface="+mn-lt"/>
+                <a:ea typeface="+mn-ea"/>
+                <a:cs typeface="+mn-cs"/>
+              </a:defRPr>
+            </a:lvl8pPr>
+            <a:lvl9pPr marL="3886200" indent="-228600" algn="l" defTabSz="457200" rtl="0" eaLnBrk="1" latinLnBrk="0" hangingPunct="1">
+              <a:spcBef>
+                <a:spcPct val="20000"/>
+              </a:spcBef>
+              <a:buFont typeface="Arial"/>
+              <a:buChar char="•"/>
+              <a:defRPr sz="2000" kern="1200">
+                <a:solidFill>
+                  <a:schemeClr val="tx1"/>
+                </a:solidFill>
+                <a:latin typeface="+mn-lt"/>
+                <a:ea typeface="+mn-ea"/>
+                <a:cs typeface="+mn-cs"/>
+              </a:defRPr>
+            </a:lvl9pPr>
+          </a:lstStyle>
+          <a:p>
+            <a:pPr marL="228600" indent="0">
+              <a:spcBef>
+                <a:spcPts val="0"/>
+              </a:spcBef>
+              <a:buClr>
+                <a:schemeClr val="tx1"/>
+              </a:buClr>
+              <a:buSzPct val="100000"/>
+              <a:buNone/>
+            </a:pPr>
+            <a:r>
+              <a:rPr lang="en-US" sz="2000" dirty="0" smtClean="0">
+                <a:solidFill>
+                  <a:srgbClr val="FFFFFF"/>
+                </a:solidFill>
+                <a:latin typeface="Proxima Nova"/>
+                <a:ea typeface="Source Sans Pro"/>
+                <a:cs typeface="Proxima Nova"/>
+                <a:sym typeface="Source Sans Pro"/>
+              </a:rPr>
+              <a:t>Source control product using </a:t>
+            </a:r>
+            <a:r>
+              <a:rPr lang="en-US" sz="2000" dirty="0" err="1" smtClean="0">
+                <a:solidFill>
+                  <a:srgbClr val="FFFFFF"/>
+                </a:solidFill>
+                <a:latin typeface="Proxima Nova"/>
+                <a:ea typeface="Source Sans Pro"/>
+                <a:cs typeface="Proxima Nova"/>
+                <a:sym typeface="Source Sans Pro"/>
+              </a:rPr>
+              <a:t>git</a:t>
+            </a:r>
+            <a:endParaRPr lang="en-US" sz="2000" dirty="0" smtClean="0">
+              <a:solidFill>
+                <a:srgbClr val="FFFFFF"/>
+              </a:solidFill>
+              <a:latin typeface="Proxima Nova"/>
+              <a:ea typeface="Source Sans Pro"/>
+              <a:cs typeface="Proxima Nova"/>
+              <a:sym typeface="Source Sans Pro"/>
+            </a:endParaRPr>
+          </a:p>
+          <a:p>
+            <a:pPr marL="0" indent="0">
+              <a:spcBef>
+                <a:spcPts val="0"/>
+              </a:spcBef>
+              <a:buClr>
+                <a:schemeClr val="tx1"/>
+              </a:buClr>
+              <a:buSzPct val="25000"/>
+              <a:buNone/>
+            </a:pPr>
+            <a:endParaRPr lang="en-US" sz="2000" dirty="0" smtClean="0">
+              <a:solidFill>
+                <a:srgbClr val="FFFFFF"/>
+              </a:solidFill>
+              <a:latin typeface="Proxima Nova"/>
+              <a:ea typeface="Source Sans Pro"/>
+              <a:cs typeface="Proxima Nova"/>
+              <a:sym typeface="Source Sans Pro"/>
+            </a:endParaRPr>
+          </a:p>
+          <a:p>
+            <a:pPr marL="228600" indent="0">
+              <a:spcBef>
+                <a:spcPts val="0"/>
+              </a:spcBef>
+              <a:buClr>
+                <a:schemeClr val="tx1"/>
+              </a:buClr>
+              <a:buSzPct val="100000"/>
+              <a:buNone/>
+            </a:pPr>
+            <a:r>
+              <a:rPr lang="en-US" sz="2000" dirty="0" smtClean="0">
+                <a:solidFill>
+                  <a:srgbClr val="FFFFFF"/>
+                </a:solidFill>
+                <a:latin typeface="Proxima Nova"/>
+                <a:ea typeface="Source Sans Pro"/>
+                <a:cs typeface="Proxima Nova"/>
+                <a:sym typeface="Source Sans Pro"/>
+              </a:rPr>
+              <a:t>Includes </a:t>
+            </a:r>
+            <a:r>
+              <a:rPr lang="en-US" sz="2000" dirty="0" err="1" smtClean="0">
+                <a:solidFill>
+                  <a:srgbClr val="FFFFFF"/>
+                </a:solidFill>
+                <a:latin typeface="Proxima Nova"/>
+                <a:ea typeface="Source Sans Pro"/>
+                <a:cs typeface="Proxima Nova"/>
+                <a:sym typeface="Source Sans Pro"/>
+              </a:rPr>
+              <a:t>git</a:t>
+            </a:r>
+            <a:r>
+              <a:rPr lang="en-US" sz="2000" dirty="0" smtClean="0">
+                <a:solidFill>
+                  <a:srgbClr val="FFFFFF"/>
+                </a:solidFill>
+                <a:latin typeface="Proxima Nova"/>
+                <a:ea typeface="Source Sans Pro"/>
+                <a:cs typeface="Proxima Nova"/>
+                <a:sym typeface="Source Sans Pro"/>
+              </a:rPr>
+              <a:t> repository management, code reviews, issue tracking, wikis and much more</a:t>
+            </a:r>
+          </a:p>
+          <a:p>
+            <a:pPr marL="0" indent="0">
+              <a:spcBef>
+                <a:spcPts val="0"/>
+              </a:spcBef>
+              <a:buClr>
+                <a:schemeClr val="tx1"/>
+              </a:buClr>
+              <a:buSzPct val="25000"/>
+              <a:buNone/>
+            </a:pPr>
+            <a:endParaRPr lang="en-US" sz="2000" dirty="0" smtClean="0">
+              <a:solidFill>
+                <a:srgbClr val="FFFFFF"/>
+              </a:solidFill>
+              <a:latin typeface="Proxima Nova"/>
+              <a:ea typeface="Source Sans Pro"/>
+              <a:cs typeface="Proxima Nova"/>
+              <a:sym typeface="Source Sans Pro"/>
+            </a:endParaRPr>
+          </a:p>
+          <a:p>
+            <a:pPr marL="228600" indent="0">
+              <a:spcBef>
+                <a:spcPts val="0"/>
+              </a:spcBef>
+              <a:buClr>
+                <a:schemeClr val="tx1"/>
+              </a:buClr>
+              <a:buSzPct val="100000"/>
+              <a:buNone/>
+            </a:pPr>
+            <a:r>
+              <a:rPr lang="en-US" sz="2000" dirty="0" smtClean="0">
+                <a:solidFill>
+                  <a:srgbClr val="FFFFFF"/>
+                </a:solidFill>
+                <a:latin typeface="Proxima Nova"/>
+                <a:ea typeface="Source Sans Pro"/>
+                <a:cs typeface="Proxima Nova"/>
+                <a:sym typeface="Source Sans Pro"/>
+              </a:rPr>
+              <a:t>Provides a managed solution, including automated deployment, configuration, scaling and upgrade</a:t>
+            </a:r>
+            <a:endParaRPr lang="en-US" sz="2000" dirty="0">
+              <a:solidFill>
+                <a:srgbClr val="FFFFFF"/>
+              </a:solidFill>
+              <a:latin typeface="Proxima Nova"/>
+              <a:ea typeface="Source Sans Pro"/>
+              <a:cs typeface="Proxima Nova"/>
+              <a:sym typeface="Source Sans Pro"/>
+            </a:endParaRPr>
+          </a:p>
+        </p:txBody>
+      </p:sp>
+    </p:spTree>
+    <p:extLst>
+      <p:ext uri="{BB962C8B-B14F-4D97-AF65-F5344CB8AC3E}">
+        <p14:creationId xmlns:p14="http://schemas.microsoft.com/office/powerpoint/2010/main" val="3928130125"/>
+      </p:ext>
+    </p:extLst>
+  </p:cSld>
+  <p:clrMapOvr>
+    <a:masterClrMapping/>
+  </p:clrMapOvr>
+  <p:timing>
+    <p:tnLst>
+      <p:par>
+        <p:cTn xmlns:p14="http://schemas.microsoft.com/office/powerpoint/2010/main" id="1" dur="indefinite" restart="never" nodeType="tmRoot"/>
+      </p:par>
+    </p:tnLst>
+  </p:timing>
+</p:sld>
+</file>
+
+<file path=ppt/slides/slide21.xml><?xml version="1.0" encoding="utf-8"?>
+<p:sld xmlns:a="http://schemas.openxmlformats.org/drawingml/2006/main" xmlns:r="http://schemas.openxmlformats.org/officeDocument/2006/relationships" xmlns:p="http://schemas.openxmlformats.org/presentationml/2006/main">
+  <p:cSld>
+    <p:spTree>
+      <p:nvGrpSpPr>
+        <p:cNvPr id="1" name=""/>
+        <p:cNvGrpSpPr/>
+        <p:nvPr/>
+      </p:nvGrpSpPr>
+      <p:grpSpPr>
+        <a:xfrm>
+          <a:off x="0" y="0"/>
+          <a:ext cx="0" cy="0"/>
+          <a:chOff x="0" y="0"/>
+          <a:chExt cx="0" cy="0"/>
+        </a:xfrm>
+      </p:grpSpPr>
+      <p:sp>
+        <p:nvSpPr>
+          <p:cNvPr id="8" name="Title 7"/>
+          <p:cNvSpPr>
+            <a:spLocks noGrp="1"/>
+          </p:cNvSpPr>
+          <p:nvPr>
+            <p:ph type="title"/>
+          </p:nvPr>
+        </p:nvSpPr>
+        <p:spPr>
+          <a:prstGeom prst="rect">
+            <a:avLst/>
+          </a:prstGeom>
+        </p:spPr>
+        <p:txBody>
+          <a:bodyPr/>
+          <a:lstStyle/>
+          <a:p>
+            <a:r>
+              <a:rPr lang="en-US" b="1" dirty="0" smtClean="0">
+                <a:solidFill>
+                  <a:srgbClr val="FFFFFF"/>
+                </a:solidFill>
+                <a:latin typeface="Proxima Nova"/>
+                <a:cs typeface="Proxima Nova"/>
+              </a:rPr>
               <a:t>Benefits of </a:t>
             </a:r>
             <a:r>
@@ -9204,7 +10091,7 @@
 </p:sld>
 </file>
 
-<file path=ppt/slides/slide21.xml><?xml version="1.0" encoding="utf-8"?>
+<file path=ppt/slides/slide22.xml><?xml version="1.0" encoding="utf-8"?>
 <p:sld xmlns:a="http://schemas.openxmlformats.org/drawingml/2006/main" xmlns:r="http://schemas.openxmlformats.org/officeDocument/2006/relationships" xmlns:p="http://schemas.openxmlformats.org/presentationml/2006/main">
   <p:cSld>
     <p:spTree>
@@ -9355,390 +10242,6 @@
     <p:extLst>
       <p:ext uri="{BB962C8B-B14F-4D97-AF65-F5344CB8AC3E}">
         <p14:creationId xmlns:p14="http://schemas.microsoft.com/office/powerpoint/2010/main" val="2444945466"/>
-      </p:ext>
-    </p:extLst>
-  </p:cSld>
-  <p:clrMapOvr>
-    <a:masterClrMapping/>
-  </p:clrMapOvr>
-  <p:timing>
-    <p:tnLst>
-      <p:par>
-        <p:cTn xmlns:p14="http://schemas.microsoft.com/office/powerpoint/2010/main" id="1" dur="indefinite" restart="never" nodeType="tmRoot"/>
-      </p:par>
-    </p:tnLst>
-  </p:timing>
-</p:sld>
-</file>
-
-<file path=ppt/slides/slide22.xml><?xml version="1.0" encoding="utf-8"?>
-<p:sld xmlns:a="http://schemas.openxmlformats.org/drawingml/2006/main" xmlns:r="http://schemas.openxmlformats.org/officeDocument/2006/relationships" xmlns:p="http://schemas.openxmlformats.org/presentationml/2006/main">
-  <p:cSld>
-    <p:spTree>
-      <p:nvGrpSpPr>
-        <p:cNvPr id="1" name=""/>
-        <p:cNvGrpSpPr/>
-        <p:nvPr/>
-      </p:nvGrpSpPr>
-      <p:grpSpPr>
-        <a:xfrm>
-          <a:off x="0" y="0"/>
-          <a:ext cx="0" cy="0"/>
-          <a:chOff x="0" y="0"/>
-          <a:chExt cx="0" cy="0"/>
-        </a:xfrm>
-      </p:grpSpPr>
-      <p:sp>
-        <p:nvSpPr>
-          <p:cNvPr id="8" name="Title 7"/>
-          <p:cNvSpPr>
-            <a:spLocks noGrp="1"/>
-          </p:cNvSpPr>
-          <p:nvPr>
-            <p:ph type="title"/>
-          </p:nvPr>
-        </p:nvSpPr>
-        <p:spPr>
-          <a:prstGeom prst="rect">
-            <a:avLst/>
-          </a:prstGeom>
-        </p:spPr>
-        <p:txBody>
-          <a:bodyPr/>
-          <a:lstStyle/>
-          <a:p>
-            <a:r>
-              <a:rPr lang="en-US" b="1" dirty="0" smtClean="0">
-                <a:solidFill>
-                  <a:srgbClr val="FFFFFF"/>
-                </a:solidFill>
-                <a:latin typeface="Proxima Nova"/>
-                <a:cs typeface="Proxima Nova"/>
-              </a:rPr>
-              <a:t>What is JFrog Artifactory?</a:t>
-            </a:r>
-            <a:endParaRPr lang="en-US" b="1" dirty="0">
-              <a:solidFill>
-                <a:srgbClr val="FFFFFF"/>
-              </a:solidFill>
-              <a:latin typeface="Proxima Nova"/>
-              <a:cs typeface="Proxima Nova"/>
-            </a:endParaRPr>
-          </a:p>
-        </p:txBody>
-      </p:sp>
-      <p:sp>
-        <p:nvSpPr>
-          <p:cNvPr id="5" name="Shape 417"/>
-          <p:cNvSpPr txBox="1">
-            <a:spLocks noGrp="1"/>
-          </p:cNvSpPr>
-          <p:nvPr>
-            <p:ph sz="quarter" idx="10"/>
-          </p:nvPr>
-        </p:nvSpPr>
-        <p:spPr>
-          <a:xfrm>
-            <a:off x="414001" y="1719179"/>
-            <a:ext cx="8229600" cy="2739631"/>
-          </a:xfrm>
-          <a:prstGeom prst="rect">
-            <a:avLst/>
-          </a:prstGeom>
-        </p:spPr>
-        <p:txBody>
-          <a:bodyPr lIns="91425" tIns="91425" rIns="91425" bIns="91425" anchor="t" anchorCtr="0">
-            <a:noAutofit/>
-          </a:bodyPr>
-          <a:lstStyle/>
-          <a:p>
-            <a:pPr marL="812800" lvl="1">
-              <a:spcBef>
-                <a:spcPts val="0"/>
-              </a:spcBef>
-              <a:buSzPct val="100000"/>
-              <a:buFont typeface="Arial"/>
-              <a:buChar char="•"/>
-            </a:pPr>
-            <a:r>
-              <a:rPr lang="en-US" sz="1800" dirty="0" smtClean="0">
-                <a:solidFill>
-                  <a:srgbClr val="FFFFFF"/>
-                </a:solidFill>
-                <a:latin typeface="Proxima Nova"/>
-                <a:cs typeface="Proxima Nova"/>
-              </a:rPr>
-              <a:t>Reliable. Artifactory </a:t>
-            </a:r>
-            <a:r>
-              <a:rPr lang="en-US" sz="1800" dirty="0">
-                <a:solidFill>
-                  <a:srgbClr val="FFFFFF"/>
-                </a:solidFill>
-                <a:latin typeface="Proxima Nova"/>
-                <a:cs typeface="Proxima Nova"/>
-              </a:rPr>
-              <a:t>guarantees consistent access to the components needed by your build </a:t>
-            </a:r>
-            <a:r>
-              <a:rPr lang="en-US" sz="1800" dirty="0" smtClean="0">
-                <a:solidFill>
-                  <a:srgbClr val="FFFFFF"/>
-                </a:solidFill>
-                <a:latin typeface="Proxima Nova"/>
-                <a:cs typeface="Proxima Nova"/>
-              </a:rPr>
-              <a:t>tools</a:t>
-            </a:r>
-            <a:endParaRPr lang="en-US" sz="1800" dirty="0">
-              <a:solidFill>
-                <a:srgbClr val="FFFFFF"/>
-              </a:solidFill>
-              <a:latin typeface="Proxima Nova"/>
-              <a:cs typeface="Proxima Nova"/>
-            </a:endParaRPr>
-          </a:p>
-          <a:p>
-            <a:pPr marL="812800" lvl="1">
-              <a:spcBef>
-                <a:spcPts val="0"/>
-              </a:spcBef>
-              <a:buSzPct val="100000"/>
-              <a:buFont typeface="Arial"/>
-              <a:buChar char="•"/>
-            </a:pPr>
-            <a:r>
-              <a:rPr lang="en-US" sz="1800" dirty="0" smtClean="0">
-                <a:solidFill>
-                  <a:srgbClr val="FFFFFF"/>
-                </a:solidFill>
-                <a:latin typeface="Proxima Nova"/>
-                <a:cs typeface="Proxima Nova"/>
-              </a:rPr>
-              <a:t>Efficient. Remote </a:t>
-            </a:r>
-            <a:r>
-              <a:rPr lang="en-US" sz="1800" dirty="0">
-                <a:solidFill>
-                  <a:srgbClr val="FFFFFF"/>
-                </a:solidFill>
-                <a:latin typeface="Proxima Nova"/>
-                <a:cs typeface="Proxima Nova"/>
-              </a:rPr>
-              <a:t>artifacts are cached locally for </a:t>
-            </a:r>
-            <a:r>
-              <a:rPr lang="en-US" sz="1800" dirty="0" smtClean="0">
-                <a:solidFill>
-                  <a:srgbClr val="FFFFFF"/>
-                </a:solidFill>
-                <a:latin typeface="Proxima Nova"/>
-                <a:cs typeface="Proxima Nova"/>
-              </a:rPr>
-              <a:t>reuse; they do not need to be re-downloaded over </a:t>
-            </a:r>
-            <a:r>
-              <a:rPr lang="en-US" sz="1800" dirty="0">
-                <a:solidFill>
-                  <a:srgbClr val="FFFFFF"/>
-                </a:solidFill>
-                <a:latin typeface="Proxima Nova"/>
-                <a:cs typeface="Proxima Nova"/>
-              </a:rPr>
-              <a:t>and </a:t>
-            </a:r>
-            <a:r>
-              <a:rPr lang="en-US" sz="1800" dirty="0" smtClean="0">
-                <a:solidFill>
-                  <a:srgbClr val="FFFFFF"/>
-                </a:solidFill>
-                <a:latin typeface="Proxima Nova"/>
-                <a:cs typeface="Proxima Nova"/>
-              </a:rPr>
-              <a:t>over</a:t>
-            </a:r>
-            <a:endParaRPr lang="en-US" sz="1800" dirty="0">
-              <a:solidFill>
-                <a:srgbClr val="FFFFFF"/>
-              </a:solidFill>
-              <a:latin typeface="Proxima Nova"/>
-              <a:cs typeface="Proxima Nova"/>
-            </a:endParaRPr>
-          </a:p>
-          <a:p>
-            <a:pPr marL="812800" lvl="1">
-              <a:spcBef>
-                <a:spcPts val="0"/>
-              </a:spcBef>
-              <a:buSzPct val="100000"/>
-              <a:buFont typeface="Arial"/>
-              <a:buChar char="•"/>
-            </a:pPr>
-            <a:r>
-              <a:rPr lang="en-US" sz="1800" dirty="0" smtClean="0">
-                <a:solidFill>
-                  <a:srgbClr val="FFFFFF"/>
-                </a:solidFill>
-                <a:latin typeface="Proxima Nova"/>
-                <a:cs typeface="Proxima Nova"/>
-              </a:rPr>
-              <a:t>Secure. Fine-grained permissions and roles govern who can deploy what, and where</a:t>
-            </a:r>
-          </a:p>
-          <a:p>
-            <a:pPr marL="812800" lvl="1">
-              <a:spcBef>
-                <a:spcPts val="0"/>
-              </a:spcBef>
-              <a:buSzPct val="100000"/>
-              <a:buFont typeface="Arial"/>
-              <a:buChar char="•"/>
-            </a:pPr>
-            <a:r>
-              <a:rPr lang="en-US" sz="1800" dirty="0" smtClean="0">
-                <a:solidFill>
-                  <a:srgbClr val="FFFFFF"/>
-                </a:solidFill>
-                <a:latin typeface="Proxima Nova"/>
-                <a:cs typeface="Proxima Nova"/>
-              </a:rPr>
-              <a:t>Scalable. Handles large </a:t>
-            </a:r>
-            <a:r>
-              <a:rPr lang="en-US" sz="1800" dirty="0">
-                <a:solidFill>
-                  <a:srgbClr val="FFFFFF"/>
-                </a:solidFill>
-                <a:latin typeface="Proxima Nova"/>
-                <a:cs typeface="Proxima Nova"/>
-              </a:rPr>
-              <a:t>load bursts with extremely high concurrency and </a:t>
-            </a:r>
-            <a:r>
-              <a:rPr lang="en-US" sz="1800" dirty="0" smtClean="0">
-                <a:solidFill>
-                  <a:srgbClr val="FFFFFF"/>
-                </a:solidFill>
-                <a:latin typeface="Proxima Nova"/>
-                <a:cs typeface="Proxima Nova"/>
-              </a:rPr>
-              <a:t>data integrity</a:t>
-            </a:r>
-            <a:endParaRPr lang="en-US" sz="1800" dirty="0">
-              <a:solidFill>
-                <a:srgbClr val="FFFFFF"/>
-              </a:solidFill>
-              <a:latin typeface="Proxima Nova"/>
-              <a:cs typeface="Proxima Nova"/>
-            </a:endParaRPr>
-          </a:p>
-          <a:p>
-            <a:pPr marL="812800" lvl="1">
-              <a:spcBef>
-                <a:spcPts val="0"/>
-              </a:spcBef>
-              <a:buSzPct val="100000"/>
-              <a:buFont typeface="Arial"/>
-              <a:buChar char="•"/>
-            </a:pPr>
-            <a:r>
-              <a:rPr lang="en-US" sz="1800" dirty="0" smtClean="0">
-                <a:solidFill>
-                  <a:srgbClr val="FFFFFF"/>
-                </a:solidFill>
-                <a:latin typeface="Proxima Nova"/>
-                <a:cs typeface="Proxima Nova"/>
-              </a:rPr>
-              <a:t>Programmable. Automate with REST APIs</a:t>
-            </a:r>
-          </a:p>
-        </p:txBody>
-      </p:sp>
-      <p:sp>
-        <p:nvSpPr>
-          <p:cNvPr id="2" name="TextBox 1"/>
-          <p:cNvSpPr txBox="1"/>
-          <p:nvPr/>
-        </p:nvSpPr>
-        <p:spPr>
-          <a:xfrm>
-            <a:off x="354226" y="1019413"/>
-            <a:ext cx="8665579" cy="923330"/>
-          </a:xfrm>
-          <a:prstGeom prst="rect">
-            <a:avLst/>
-          </a:prstGeom>
-          <a:noFill/>
-        </p:spPr>
-        <p:txBody>
-          <a:bodyPr wrap="square" rtlCol="0">
-            <a:spAutoFit/>
-          </a:bodyPr>
-          <a:lstStyle/>
-          <a:p>
-            <a:pPr marL="127000" lvl="0">
-              <a:buSzPct val="100000"/>
-            </a:pPr>
-            <a:r>
-              <a:rPr lang="en-US" b="1" dirty="0">
-                <a:solidFill>
-                  <a:srgbClr val="FFFFFF"/>
-                </a:solidFill>
-                <a:latin typeface="Proxima Nova"/>
-                <a:cs typeface="Proxima Nova"/>
-              </a:rPr>
-              <a:t>An advanced repository </a:t>
-            </a:r>
-            <a:r>
-              <a:rPr lang="en-US" b="1" dirty="0" smtClean="0">
-                <a:solidFill>
-                  <a:srgbClr val="FFFFFF"/>
-                </a:solidFill>
-                <a:latin typeface="Proxima Nova"/>
-                <a:cs typeface="Proxima Nova"/>
-              </a:rPr>
-              <a:t>manager and a </a:t>
-            </a:r>
-            <a:r>
-              <a:rPr lang="en-US" b="1" dirty="0">
-                <a:solidFill>
-                  <a:srgbClr val="FFFFFF"/>
-                </a:solidFill>
-                <a:latin typeface="Proxima Nova"/>
-                <a:cs typeface="Proxima Nova"/>
-              </a:rPr>
-              <a:t>complete platform for automated software package management from </a:t>
-            </a:r>
-            <a:r>
-              <a:rPr lang="en-US" b="1" dirty="0" smtClean="0">
-                <a:solidFill>
-                  <a:srgbClr val="FFFFFF"/>
-                </a:solidFill>
-                <a:latin typeface="Proxima Nova"/>
-                <a:cs typeface="Proxima Nova"/>
-              </a:rPr>
-              <a:t>development </a:t>
-            </a:r>
-            <a:r>
-              <a:rPr lang="en-US" b="1" dirty="0">
-                <a:solidFill>
-                  <a:srgbClr val="FFFFFF"/>
-                </a:solidFill>
-                <a:latin typeface="Proxima Nova"/>
-                <a:cs typeface="Proxima Nova"/>
-              </a:rPr>
-              <a:t>to distribution</a:t>
-            </a:r>
-          </a:p>
-          <a:p>
-            <a:endParaRPr lang="en-US" dirty="0"/>
-          </a:p>
-        </p:txBody>
-      </p:sp>
-    </p:spTree>
-    <p:extLst>
-      <p:ext uri="{BB962C8B-B14F-4D97-AF65-F5344CB8AC3E}">
-        <p14:creationId xmlns:p14="http://schemas.microsoft.com/office/powerpoint/2010/main" val="263023444"/>
       </p:ext>
     </p:extLst>
   </p:cSld>
@@ -9799,6 +10302,390 @@
                 <a:latin typeface="Proxima Nova"/>
                 <a:cs typeface="Proxima Nova"/>
               </a:rPr>
+              <a:t>What is JFrog Artifactory?</a:t>
+            </a:r>
+            <a:endParaRPr lang="en-US" b="1" dirty="0">
+              <a:solidFill>
+                <a:srgbClr val="FFFFFF"/>
+              </a:solidFill>
+              <a:latin typeface="Proxima Nova"/>
+              <a:cs typeface="Proxima Nova"/>
+            </a:endParaRPr>
+          </a:p>
+        </p:txBody>
+      </p:sp>
+      <p:sp>
+        <p:nvSpPr>
+          <p:cNvPr id="5" name="Shape 417"/>
+          <p:cNvSpPr txBox="1">
+            <a:spLocks noGrp="1"/>
+          </p:cNvSpPr>
+          <p:nvPr>
+            <p:ph sz="quarter" idx="10"/>
+          </p:nvPr>
+        </p:nvSpPr>
+        <p:spPr>
+          <a:xfrm>
+            <a:off x="414001" y="1719179"/>
+            <a:ext cx="8229600" cy="2739631"/>
+          </a:xfrm>
+          <a:prstGeom prst="rect">
+            <a:avLst/>
+          </a:prstGeom>
+        </p:spPr>
+        <p:txBody>
+          <a:bodyPr lIns="91425" tIns="91425" rIns="91425" bIns="91425" anchor="t" anchorCtr="0">
+            <a:noAutofit/>
+          </a:bodyPr>
+          <a:lstStyle/>
+          <a:p>
+            <a:pPr marL="812800" lvl="1">
+              <a:spcBef>
+                <a:spcPts val="0"/>
+              </a:spcBef>
+              <a:buSzPct val="100000"/>
+              <a:buFont typeface="Arial"/>
+              <a:buChar char="•"/>
+            </a:pPr>
+            <a:r>
+              <a:rPr lang="en-US" sz="1800" dirty="0" smtClean="0">
+                <a:solidFill>
+                  <a:srgbClr val="FFFFFF"/>
+                </a:solidFill>
+                <a:latin typeface="Proxima Nova"/>
+                <a:cs typeface="Proxima Nova"/>
+              </a:rPr>
+              <a:t>Reliable. Artifactory </a:t>
+            </a:r>
+            <a:r>
+              <a:rPr lang="en-US" sz="1800" dirty="0">
+                <a:solidFill>
+                  <a:srgbClr val="FFFFFF"/>
+                </a:solidFill>
+                <a:latin typeface="Proxima Nova"/>
+                <a:cs typeface="Proxima Nova"/>
+              </a:rPr>
+              <a:t>guarantees consistent access to the components needed by your build </a:t>
+            </a:r>
+            <a:r>
+              <a:rPr lang="en-US" sz="1800" dirty="0" smtClean="0">
+                <a:solidFill>
+                  <a:srgbClr val="FFFFFF"/>
+                </a:solidFill>
+                <a:latin typeface="Proxima Nova"/>
+                <a:cs typeface="Proxima Nova"/>
+              </a:rPr>
+              <a:t>tools</a:t>
+            </a:r>
+            <a:endParaRPr lang="en-US" sz="1800" dirty="0">
+              <a:solidFill>
+                <a:srgbClr val="FFFFFF"/>
+              </a:solidFill>
+              <a:latin typeface="Proxima Nova"/>
+              <a:cs typeface="Proxima Nova"/>
+            </a:endParaRPr>
+          </a:p>
+          <a:p>
+            <a:pPr marL="812800" lvl="1">
+              <a:spcBef>
+                <a:spcPts val="0"/>
+              </a:spcBef>
+              <a:buSzPct val="100000"/>
+              <a:buFont typeface="Arial"/>
+              <a:buChar char="•"/>
+            </a:pPr>
+            <a:r>
+              <a:rPr lang="en-US" sz="1800" dirty="0" smtClean="0">
+                <a:solidFill>
+                  <a:srgbClr val="FFFFFF"/>
+                </a:solidFill>
+                <a:latin typeface="Proxima Nova"/>
+                <a:cs typeface="Proxima Nova"/>
+              </a:rPr>
+              <a:t>Efficient. Remote </a:t>
+            </a:r>
+            <a:r>
+              <a:rPr lang="en-US" sz="1800" dirty="0">
+                <a:solidFill>
+                  <a:srgbClr val="FFFFFF"/>
+                </a:solidFill>
+                <a:latin typeface="Proxima Nova"/>
+                <a:cs typeface="Proxima Nova"/>
+              </a:rPr>
+              <a:t>artifacts are cached locally for </a:t>
+            </a:r>
+            <a:r>
+              <a:rPr lang="en-US" sz="1800" dirty="0" smtClean="0">
+                <a:solidFill>
+                  <a:srgbClr val="FFFFFF"/>
+                </a:solidFill>
+                <a:latin typeface="Proxima Nova"/>
+                <a:cs typeface="Proxima Nova"/>
+              </a:rPr>
+              <a:t>reuse; they do not need to be re-downloaded over </a:t>
+            </a:r>
+            <a:r>
+              <a:rPr lang="en-US" sz="1800" dirty="0">
+                <a:solidFill>
+                  <a:srgbClr val="FFFFFF"/>
+                </a:solidFill>
+                <a:latin typeface="Proxima Nova"/>
+                <a:cs typeface="Proxima Nova"/>
+              </a:rPr>
+              <a:t>and </a:t>
+            </a:r>
+            <a:r>
+              <a:rPr lang="en-US" sz="1800" dirty="0" smtClean="0">
+                <a:solidFill>
+                  <a:srgbClr val="FFFFFF"/>
+                </a:solidFill>
+                <a:latin typeface="Proxima Nova"/>
+                <a:cs typeface="Proxima Nova"/>
+              </a:rPr>
+              <a:t>over</a:t>
+            </a:r>
+            <a:endParaRPr lang="en-US" sz="1800" dirty="0">
+              <a:solidFill>
+                <a:srgbClr val="FFFFFF"/>
+              </a:solidFill>
+              <a:latin typeface="Proxima Nova"/>
+              <a:cs typeface="Proxima Nova"/>
+            </a:endParaRPr>
+          </a:p>
+          <a:p>
+            <a:pPr marL="812800" lvl="1">
+              <a:spcBef>
+                <a:spcPts val="0"/>
+              </a:spcBef>
+              <a:buSzPct val="100000"/>
+              <a:buFont typeface="Arial"/>
+              <a:buChar char="•"/>
+            </a:pPr>
+            <a:r>
+              <a:rPr lang="en-US" sz="1800" dirty="0" smtClean="0">
+                <a:solidFill>
+                  <a:srgbClr val="FFFFFF"/>
+                </a:solidFill>
+                <a:latin typeface="Proxima Nova"/>
+                <a:cs typeface="Proxima Nova"/>
+              </a:rPr>
+              <a:t>Secure. Fine-grained permissions and roles govern who can deploy what, and where</a:t>
+            </a:r>
+          </a:p>
+          <a:p>
+            <a:pPr marL="812800" lvl="1">
+              <a:spcBef>
+                <a:spcPts val="0"/>
+              </a:spcBef>
+              <a:buSzPct val="100000"/>
+              <a:buFont typeface="Arial"/>
+              <a:buChar char="•"/>
+            </a:pPr>
+            <a:r>
+              <a:rPr lang="en-US" sz="1800" dirty="0" smtClean="0">
+                <a:solidFill>
+                  <a:srgbClr val="FFFFFF"/>
+                </a:solidFill>
+                <a:latin typeface="Proxima Nova"/>
+                <a:cs typeface="Proxima Nova"/>
+              </a:rPr>
+              <a:t>Scalable. Handles large </a:t>
+            </a:r>
+            <a:r>
+              <a:rPr lang="en-US" sz="1800" dirty="0">
+                <a:solidFill>
+                  <a:srgbClr val="FFFFFF"/>
+                </a:solidFill>
+                <a:latin typeface="Proxima Nova"/>
+                <a:cs typeface="Proxima Nova"/>
+              </a:rPr>
+              <a:t>load bursts with extremely high concurrency and </a:t>
+            </a:r>
+            <a:r>
+              <a:rPr lang="en-US" sz="1800" dirty="0" smtClean="0">
+                <a:solidFill>
+                  <a:srgbClr val="FFFFFF"/>
+                </a:solidFill>
+                <a:latin typeface="Proxima Nova"/>
+                <a:cs typeface="Proxima Nova"/>
+              </a:rPr>
+              <a:t>data integrity</a:t>
+            </a:r>
+            <a:endParaRPr lang="en-US" sz="1800" dirty="0">
+              <a:solidFill>
+                <a:srgbClr val="FFFFFF"/>
+              </a:solidFill>
+              <a:latin typeface="Proxima Nova"/>
+              <a:cs typeface="Proxima Nova"/>
+            </a:endParaRPr>
+          </a:p>
+          <a:p>
+            <a:pPr marL="812800" lvl="1">
+              <a:spcBef>
+                <a:spcPts val="0"/>
+              </a:spcBef>
+              <a:buSzPct val="100000"/>
+              <a:buFont typeface="Arial"/>
+              <a:buChar char="•"/>
+            </a:pPr>
+            <a:r>
+              <a:rPr lang="en-US" sz="1800" dirty="0" smtClean="0">
+                <a:solidFill>
+                  <a:srgbClr val="FFFFFF"/>
+                </a:solidFill>
+                <a:latin typeface="Proxima Nova"/>
+                <a:cs typeface="Proxima Nova"/>
+              </a:rPr>
+              <a:t>Programmable. Automate with REST APIs</a:t>
+            </a:r>
+          </a:p>
+        </p:txBody>
+      </p:sp>
+      <p:sp>
+        <p:nvSpPr>
+          <p:cNvPr id="2" name="TextBox 1"/>
+          <p:cNvSpPr txBox="1"/>
+          <p:nvPr/>
+        </p:nvSpPr>
+        <p:spPr>
+          <a:xfrm>
+            <a:off x="354226" y="1019413"/>
+            <a:ext cx="8665579" cy="923330"/>
+          </a:xfrm>
+          <a:prstGeom prst="rect">
+            <a:avLst/>
+          </a:prstGeom>
+          <a:noFill/>
+        </p:spPr>
+        <p:txBody>
+          <a:bodyPr wrap="square" rtlCol="0">
+            <a:spAutoFit/>
+          </a:bodyPr>
+          <a:lstStyle/>
+          <a:p>
+            <a:pPr marL="127000" lvl="0">
+              <a:buSzPct val="100000"/>
+            </a:pPr>
+            <a:r>
+              <a:rPr lang="en-US" b="1" dirty="0">
+                <a:solidFill>
+                  <a:srgbClr val="FFFFFF"/>
+                </a:solidFill>
+                <a:latin typeface="Proxima Nova"/>
+                <a:cs typeface="Proxima Nova"/>
+              </a:rPr>
+              <a:t>An advanced repository </a:t>
+            </a:r>
+            <a:r>
+              <a:rPr lang="en-US" b="1" dirty="0" smtClean="0">
+                <a:solidFill>
+                  <a:srgbClr val="FFFFFF"/>
+                </a:solidFill>
+                <a:latin typeface="Proxima Nova"/>
+                <a:cs typeface="Proxima Nova"/>
+              </a:rPr>
+              <a:t>manager and a </a:t>
+            </a:r>
+            <a:r>
+              <a:rPr lang="en-US" b="1" dirty="0">
+                <a:solidFill>
+                  <a:srgbClr val="FFFFFF"/>
+                </a:solidFill>
+                <a:latin typeface="Proxima Nova"/>
+                <a:cs typeface="Proxima Nova"/>
+              </a:rPr>
+              <a:t>complete platform for automated software package management from </a:t>
+            </a:r>
+            <a:r>
+              <a:rPr lang="en-US" b="1" dirty="0" smtClean="0">
+                <a:solidFill>
+                  <a:srgbClr val="FFFFFF"/>
+                </a:solidFill>
+                <a:latin typeface="Proxima Nova"/>
+                <a:cs typeface="Proxima Nova"/>
+              </a:rPr>
+              <a:t>development </a:t>
+            </a:r>
+            <a:r>
+              <a:rPr lang="en-US" b="1" dirty="0">
+                <a:solidFill>
+                  <a:srgbClr val="FFFFFF"/>
+                </a:solidFill>
+                <a:latin typeface="Proxima Nova"/>
+                <a:cs typeface="Proxima Nova"/>
+              </a:rPr>
+              <a:t>to distribution</a:t>
+            </a:r>
+          </a:p>
+          <a:p>
+            <a:endParaRPr lang="en-US" dirty="0"/>
+          </a:p>
+        </p:txBody>
+      </p:sp>
+    </p:spTree>
+    <p:extLst>
+      <p:ext uri="{BB962C8B-B14F-4D97-AF65-F5344CB8AC3E}">
+        <p14:creationId xmlns:p14="http://schemas.microsoft.com/office/powerpoint/2010/main" val="263023444"/>
+      </p:ext>
+    </p:extLst>
+  </p:cSld>
+  <p:clrMapOvr>
+    <a:masterClrMapping/>
+  </p:clrMapOvr>
+  <p:timing>
+    <p:tnLst>
+      <p:par>
+        <p:cTn xmlns:p14="http://schemas.microsoft.com/office/powerpoint/2010/main" id="1" dur="indefinite" restart="never" nodeType="tmRoot"/>
+      </p:par>
+    </p:tnLst>
+  </p:timing>
+</p:sld>
+</file>
+
+<file path=ppt/slides/slide24.xml><?xml version="1.0" encoding="utf-8"?>
+<p:sld xmlns:a="http://schemas.openxmlformats.org/drawingml/2006/main" xmlns:r="http://schemas.openxmlformats.org/officeDocument/2006/relationships" xmlns:p="http://schemas.openxmlformats.org/presentationml/2006/main">
+  <p:cSld>
+    <p:spTree>
+      <p:nvGrpSpPr>
+        <p:cNvPr id="1" name=""/>
+        <p:cNvGrpSpPr/>
+        <p:nvPr/>
+      </p:nvGrpSpPr>
+      <p:grpSpPr>
+        <a:xfrm>
+          <a:off x="0" y="0"/>
+          <a:ext cx="0" cy="0"/>
+          <a:chOff x="0" y="0"/>
+          <a:chExt cx="0" cy="0"/>
+        </a:xfrm>
+      </p:grpSpPr>
+      <p:sp>
+        <p:nvSpPr>
+          <p:cNvPr id="8" name="Title 7"/>
+          <p:cNvSpPr>
+            <a:spLocks noGrp="1"/>
+          </p:cNvSpPr>
+          <p:nvPr>
+            <p:ph type="title"/>
+          </p:nvPr>
+        </p:nvSpPr>
+        <p:spPr>
+          <a:prstGeom prst="rect">
+            <a:avLst/>
+          </a:prstGeom>
+        </p:spPr>
+        <p:txBody>
+          <a:bodyPr/>
+          <a:lstStyle/>
+          <a:p>
+            <a:r>
+              <a:rPr lang="en-US" b="1" dirty="0" smtClean="0">
+                <a:solidFill>
+                  <a:srgbClr val="FFFFFF"/>
+                </a:solidFill>
+                <a:latin typeface="Proxima Nova"/>
+                <a:cs typeface="Proxima Nova"/>
+              </a:rPr>
               <a:t>Benefits </a:t>
             </a:r>
             <a:r>
@@ -10431,7 +11318,7 @@
 </p:sld>
 </file>
 
-<file path=ppt/slides/slide24.xml><?xml version="1.0" encoding="utf-8"?>
+<file path=ppt/slides/slide25.xml><?xml version="1.0" encoding="utf-8"?>
 <p:sld xmlns:a="http://schemas.openxmlformats.org/drawingml/2006/main" xmlns:r="http://schemas.openxmlformats.org/officeDocument/2006/relationships" xmlns:p="http://schemas.openxmlformats.org/presentationml/2006/main">
   <p:cSld>
     <p:spTree>
@@ -11255,66 +12142,6 @@
               <a:buSzPct val="100000"/>
               <a:buNone/>
             </a:pPr>
-            <a:r>
-              <a:rPr lang="en-US" sz="2000" dirty="0" smtClean="0">
-                <a:solidFill>
-                  <a:srgbClr val="FFFFFF"/>
-                </a:solidFill>
-                <a:latin typeface="Proxima Nova"/>
-                <a:ea typeface="Arial"/>
-                <a:cs typeface="Proxima Nova"/>
-                <a:sym typeface="Arial"/>
-              </a:rPr>
-              <a:t>Good for innovation-driven projects that must continually improve</a:t>
-            </a:r>
-          </a:p>
-          <a:p>
-            <a:pPr marL="0" indent="0">
-              <a:spcBef>
-                <a:spcPts val="1200"/>
-              </a:spcBef>
-              <a:buClr>
-                <a:schemeClr val="tx1"/>
-              </a:buClr>
-              <a:buSzPct val="100000"/>
-              <a:buNone/>
-            </a:pPr>
-            <a:r>
-              <a:rPr lang="en-US" sz="2000" dirty="0" smtClean="0">
-                <a:solidFill>
-                  <a:srgbClr val="FFFFFF"/>
-                </a:solidFill>
-                <a:latin typeface="Proxima Nova"/>
-                <a:ea typeface="Arial"/>
-                <a:cs typeface="Proxima Nova"/>
-                <a:sym typeface="Arial"/>
-              </a:rPr>
-              <a:t>Increases speed &amp; quality by shifting to smaller batches, while reducing risk</a:t>
-            </a:r>
-          </a:p>
-          <a:p>
-            <a:pPr marL="0" indent="0">
-              <a:spcBef>
-                <a:spcPts val="1200"/>
-              </a:spcBef>
-              <a:buClr>
-                <a:schemeClr val="tx1"/>
-              </a:buClr>
-              <a:buSzPct val="100000"/>
-              <a:buNone/>
-            </a:pPr>
-            <a:r>
-              <a:rPr lang="en-US" sz="2000" dirty="0" smtClean="0">
-                <a:solidFill>
-                  <a:srgbClr val="FFFFFF"/>
-                </a:solidFill>
-                <a:latin typeface="Proxima Nova"/>
-                <a:ea typeface="Arial"/>
-                <a:cs typeface="Proxima Nova"/>
-                <a:sym typeface="Arial"/>
-              </a:rPr>
-              <a:t>Frequent releases increases the amount of feedback used for product management</a:t>
-            </a:r>
             <a:endParaRPr lang="en-US" sz="2000" dirty="0">
               <a:solidFill>
                 <a:srgbClr val="FFFFFF"/>
@@ -11327,103 +12154,6 @@
           </a:p>
         </p:txBody>
       </p:sp>
-      <p:pic>
-        <p:nvPicPr>
-          <p:cNvPr id="8" name="Shape 262"/>
-          <p:cNvPicPr preferRelativeResize="0"/>
-          <p:nvPr/>
-        </p:nvPicPr>
-        <p:blipFill rotWithShape="1">
-          <a:blip r:embed="rId3">
-            <a:alphaModFix/>
-          </a:blip>
-          <a:srcRect/>
-          <a:stretch/>
-        </p:blipFill>
-        <p:spPr>
-          <a:xfrm>
-            <a:off x="1070195" y="1315778"/>
-            <a:ext cx="1932250" cy="1526924"/>
-          </a:xfrm>
-          <a:prstGeom prst="rect">
-            <a:avLst/>
-          </a:prstGeom>
-          <a:noFill/>
-          <a:ln>
-            <a:noFill/>
-          </a:ln>
-        </p:spPr>
-      </p:pic>
-      <p:pic>
-        <p:nvPicPr>
-          <p:cNvPr id="10" name="Shape 264"/>
-          <p:cNvPicPr preferRelativeResize="0"/>
-          <p:nvPr/>
-        </p:nvPicPr>
-        <p:blipFill rotWithShape="1">
-          <a:blip r:embed="rId4">
-            <a:alphaModFix/>
-          </a:blip>
-          <a:srcRect/>
-          <a:stretch/>
-        </p:blipFill>
-        <p:spPr>
-          <a:xfrm>
-            <a:off x="1068098" y="2968189"/>
-            <a:ext cx="1959578" cy="1557855"/>
-          </a:xfrm>
-          <a:prstGeom prst="rect">
-            <a:avLst/>
-          </a:prstGeom>
-          <a:noFill/>
-          <a:ln>
-            <a:noFill/>
-          </a:ln>
-        </p:spPr>
-      </p:pic>
-      <p:cxnSp>
-        <p:nvCxnSpPr>
-          <p:cNvPr id="13" name="Elbow Connector 12"/>
-          <p:cNvCxnSpPr>
-            <a:stCxn id="8" idx="3"/>
-            <a:endCxn id="10" idx="3"/>
-          </p:cNvCxnSpPr>
-          <p:nvPr/>
-        </p:nvCxnSpPr>
-        <p:spPr>
-          <a:xfrm>
-            <a:off x="3002445" y="2079240"/>
-            <a:ext cx="25231" cy="1667877"/>
-          </a:xfrm>
-          <a:prstGeom prst="bentConnector3">
-            <a:avLst>
-              <a:gd name="adj1" fmla="val 1006028"/>
-            </a:avLst>
-          </a:prstGeom>
-          <a:ln>
-            <a:solidFill>
-              <a:schemeClr val="accent2"/>
-            </a:solidFill>
-            <a:headEnd type="none"/>
-            <a:tailEnd type="arrow"/>
-          </a:ln>
-          <a:effectLst/>
-        </p:spPr>
-        <p:style>
-          <a:lnRef idx="2">
-            <a:schemeClr val="accent1"/>
-          </a:lnRef>
-          <a:fillRef idx="0">
-            <a:schemeClr val="accent1"/>
-          </a:fillRef>
-          <a:effectRef idx="1">
-            <a:schemeClr val="accent1"/>
-          </a:effectRef>
-          <a:fontRef idx="minor">
-            <a:schemeClr val="tx1"/>
-          </a:fontRef>
-        </p:style>
-      </p:cxnSp>
       <p:sp>
         <p:nvSpPr>
           <p:cNvPr id="22" name="Title 21"/>
@@ -11472,6 +12202,98 @@
           </a:p>
         </p:txBody>
       </p:sp>
+      <p:grpSp>
+        <p:nvGrpSpPr>
+          <p:cNvPr id="5" name="Group 4"/>
+          <p:cNvGrpSpPr/>
+          <p:nvPr/>
+        </p:nvGrpSpPr>
+        <p:grpSpPr>
+          <a:xfrm>
+            <a:off x="1229360" y="1469390"/>
+            <a:ext cx="6685280" cy="2712720"/>
+            <a:chOff x="924560" y="1310640"/>
+            <a:chExt cx="6685280" cy="2712720"/>
+          </a:xfrm>
+        </p:grpSpPr>
+        <p:sp>
+          <p:nvSpPr>
+            <p:cNvPr id="4" name="Rectangle 3"/>
+            <p:cNvSpPr/>
+            <p:nvPr/>
+          </p:nvSpPr>
+          <p:spPr>
+            <a:xfrm>
+              <a:off x="924560" y="1310640"/>
+              <a:ext cx="6685280" cy="2712720"/>
+            </a:xfrm>
+            <a:prstGeom prst="rect">
+              <a:avLst/>
+            </a:prstGeom>
+            <a:solidFill>
+              <a:schemeClr val="bg1"/>
+            </a:solidFill>
+            <a:ln>
+              <a:noFill/>
+            </a:ln>
+          </p:spPr>
+          <p:style>
+            <a:lnRef idx="1">
+              <a:schemeClr val="accent1"/>
+            </a:lnRef>
+            <a:fillRef idx="3">
+              <a:schemeClr val="accent1"/>
+            </a:fillRef>
+            <a:effectRef idx="2">
+              <a:schemeClr val="accent1"/>
+            </a:effectRef>
+            <a:fontRef idx="minor">
+              <a:schemeClr val="lt1"/>
+            </a:fontRef>
+          </p:style>
+          <p:txBody>
+            <a:bodyPr rtlCol="0" anchor="ctr"/>
+            <a:lstStyle/>
+            <a:p>
+              <a:pPr algn="ctr"/>
+              <a:endParaRPr lang="en-US"/>
+            </a:p>
+          </p:txBody>
+        </p:sp>
+        <p:pic>
+          <p:nvPicPr>
+            <p:cNvPr id="2" name="Picture 1" descr="cicd.pdf"/>
+            <p:cNvPicPr>
+              <a:picLocks noChangeAspect="1"/>
+            </p:cNvPicPr>
+            <p:nvPr/>
+          </p:nvPicPr>
+          <p:blipFill>
+            <a:blip r:embed="rId3">
+              <a:extLst>
+                <a:ext uri="{28A0092B-C50C-407E-A947-70E740481C1C}">
+                  <a14:useLocalDpi xmlns:a14="http://schemas.microsoft.com/office/drawing/2010/main" val="0"/>
+                </a:ext>
+              </a:extLst>
+            </a:blip>
+            <a:stretch>
+              <a:fillRect/>
+            </a:stretch>
+          </p:blipFill>
+          <p:spPr>
+            <a:xfrm>
+              <a:off x="1168400" y="1637030"/>
+              <a:ext cx="6045200" cy="2171700"/>
+            </a:xfrm>
+            <a:prstGeom prst="rect">
+              <a:avLst/>
+            </a:prstGeom>
+            <a:solidFill>
+              <a:schemeClr val="bg1"/>
+            </a:solidFill>
+          </p:spPr>
+        </p:pic>
+      </p:grpSp>
     </p:spTree>
     <p:extLst>
       <p:ext uri="{BB962C8B-B14F-4D97-AF65-F5344CB8AC3E}">
@@ -13160,27 +13982,7 @@
                 <a:latin typeface="Proxima Nova"/>
                 <a:cs typeface="Proxima Nova"/>
               </a:rPr>
-              <a:t>Deliver High Quality Software Faster &amp; Continuously, </a:t>
-            </a:r>
-            <a:r>
-              <a:rPr lang="en-US" sz="2000" dirty="0" smtClean="0">
-                <a:solidFill>
-                  <a:srgbClr val="FFFFFF"/>
-                </a:solidFill>
-                <a:latin typeface="Proxima Nova"/>
-                <a:cs typeface="Proxima Nova"/>
-              </a:rPr>
-              <a:t>from </a:t>
-            </a:r>
-            <a:r>
-              <a:rPr lang="en-US" sz="2000" dirty="0" smtClean="0">
-                <a:solidFill>
-                  <a:srgbClr val="FFFFFF"/>
-                </a:solidFill>
-                <a:latin typeface="Proxima Nova"/>
-                <a:cs typeface="Proxima Nova"/>
-              </a:rPr>
-              <a:t>Idea to Production</a:t>
+              <a:t>Deliver High Quality Software Faster &amp; Continuously, from Idea to Production</a:t>
             </a:r>
             <a:endParaRPr lang="en-US" sz="2000" dirty="0">
               <a:solidFill>

</xml_diff>

<commit_message>
added link to Ben's whitepaper
</commit_message>
<xml_diff>
--- a/presentations/104 - Intro to CICD/Session_9_Intro_CICD.pptx
+++ b/presentations/104 - Intro to CICD/Session_9_Intro_CICD.pptx
@@ -2397,11 +2397,7 @@
             </a:pPr>
             <a:r>
               <a:rPr lang="en-US" dirty="0" smtClean="0"/>
-              <a:t>Why </a:t>
-            </a:r>
-            <a:r>
-              <a:rPr lang="en-US" dirty="0" smtClean="0"/>
-              <a:t>does it matter to customers?</a:t>
+              <a:t>Why does it matter to customers?</a:t>
             </a:r>
           </a:p>
           <a:p>
@@ -2418,11 +2414,7 @@
             </a:pPr>
             <a:r>
               <a:rPr lang="en-US" dirty="0" smtClean="0"/>
-              <a:t>Tighter loops are good for innovation. It gives you more feedback and lets you explore, learn, and try out more things while controlling risk. These smaller loops can also just increase quality (finding defects in smaller batches of code is easier than larger batches of code, reducing risk), but that’s only part of the story Full value requires using the opportunity given by smaller loops to incrementally improve the product in week (or whatever the release period is) cycles instead of the traditionally long cycles of 6 to 12 months</a:t>
-            </a:r>
-            <a:r>
-              <a:rPr lang="en-US" dirty="0" smtClean="0"/>
-              <a:t>.</a:t>
+              <a:t>Tighter loops are good for innovation. It gives you more feedback and lets you explore, learn, and try out more things while controlling risk. These smaller loops can also just increase quality (finding defects in smaller batches of code is easier than larger batches of code, reducing risk), but that’s only part of the story Full value requires using the opportunity given by smaller loops to incrementally improve the product in week (or whatever the release period is) cycles instead of the traditionally long cycles of 6 to 12 months.</a:t>
             </a:r>
           </a:p>
           <a:p>
@@ -7624,8 +7616,8 @@
         </p:nvSpPr>
         <p:spPr>
           <a:xfrm>
-            <a:off x="1486021" y="1047222"/>
-            <a:ext cx="6669818" cy="3786900"/>
+            <a:off x="365760" y="1107440"/>
+            <a:ext cx="8575040" cy="3493002"/>
           </a:xfrm>
           <a:prstGeom prst="rect">
             <a:avLst/>
@@ -7659,7 +7651,7 @@
                 <a:cs typeface="Proxima Nova"/>
                 <a:hlinkClick r:id="rId3"/>
               </a:rPr>
-              <a:t>Continuous Deployment From GitHub To PWS Via </a:t>
+              <a:t>Speed Thrills: How to Harness the Power of CI/CD for Your Development </a:t>
             </a:r>
             <a:r>
               <a:rPr lang="en-US" b="1" u="sng" dirty="0" smtClean="0">
@@ -7670,9 +7662,9 @@
                 <a:cs typeface="Proxima Nova"/>
                 <a:hlinkClick r:id="rId3"/>
               </a:rPr>
-              <a:t>Concourse</a:t>
-            </a:r>
-            <a:endParaRPr lang="en-US" sz="1800" b="1" u="sng" dirty="0" smtClean="0">
+              <a:t>Team</a:t>
+            </a:r>
+            <a:endParaRPr lang="en-US" b="1" u="sng" dirty="0">
               <a:solidFill>
                 <a:srgbClr val="FFFFFF"/>
               </a:solidFill>
@@ -7682,6 +7674,58 @@
             </a:endParaRPr>
           </a:p>
           <a:p>
+            <a:pPr lvl="0">
+              <a:spcBef>
+                <a:spcPts val="1300"/>
+              </a:spcBef>
+              <a:buClr>
+                <a:schemeClr val="dk1"/>
+              </a:buClr>
+              <a:buSzPct val="25000"/>
+            </a:pPr>
+            <a:r>
+              <a:rPr lang="en-US" b="1" u="sng" dirty="0" smtClean="0">
+                <a:solidFill>
+                  <a:srgbClr val="FFFFFF"/>
+                </a:solidFill>
+                <a:latin typeface="Proxima Nova"/>
+                <a:cs typeface="Proxima Nova"/>
+                <a:hlinkClick r:id="rId4"/>
+              </a:rPr>
+              <a:t>Continuous </a:t>
+            </a:r>
+            <a:r>
+              <a:rPr lang="en-US" b="1" u="sng" dirty="0">
+                <a:solidFill>
+                  <a:srgbClr val="FFFFFF"/>
+                </a:solidFill>
+                <a:latin typeface="Proxima Nova"/>
+                <a:cs typeface="Proxima Nova"/>
+                <a:hlinkClick r:id="rId4"/>
+              </a:rPr>
+              <a:t>Deployment From GitHub To PWS Via </a:t>
+            </a:r>
+            <a:r>
+              <a:rPr lang="en-US" b="1" u="sng" dirty="0" smtClean="0">
+                <a:solidFill>
+                  <a:srgbClr val="FFFFFF"/>
+                </a:solidFill>
+                <a:latin typeface="Proxima Nova"/>
+                <a:cs typeface="Proxima Nova"/>
+                <a:hlinkClick r:id="rId4"/>
+              </a:rPr>
+              <a:t>Concourse</a:t>
+            </a:r>
+            <a:endParaRPr lang="en-US" sz="1800" b="1" u="sng" dirty="0" smtClean="0">
+              <a:solidFill>
+                <a:srgbClr val="FFFFFF"/>
+              </a:solidFill>
+              <a:latin typeface="Proxima Nova"/>
+              <a:cs typeface="Proxima Nova"/>
+              <a:hlinkClick r:id="rId5"/>
+            </a:endParaRPr>
+          </a:p>
+          <a:p>
             <a:pPr lvl="0" rtl="0">
               <a:spcBef>
                 <a:spcPts val="1300"/>
@@ -7700,7 +7744,7 @@
                 </a:solidFill>
                 <a:latin typeface="Proxima Nova"/>
                 <a:cs typeface="Proxima Nova"/>
-                <a:hlinkClick r:id="rId4"/>
+                <a:hlinkClick r:id="rId5"/>
               </a:rPr>
               <a:t>Concourse </a:t>
             </a:r>
@@ -7711,7 +7755,7 @@
                 </a:solidFill>
                 <a:latin typeface="Proxima Nova"/>
                 <a:cs typeface="Proxima Nova"/>
-                <a:hlinkClick r:id="rId4"/>
+                <a:hlinkClick r:id="rId5"/>
               </a:rPr>
               <a:t>Documentation</a:t>
             </a:r>
@@ -7735,7 +7779,7 @@
                 </a:solidFill>
                 <a:latin typeface="Proxima Nova"/>
                 <a:cs typeface="Proxima Nova"/>
-                <a:hlinkClick r:id="rId5"/>
+                <a:hlinkClick r:id="rId6"/>
               </a:rPr>
               <a:t>Continuous Delivery Among the Donkeys</a:t>
             </a:r>
@@ -7759,7 +7803,7 @@
                 </a:solidFill>
                 <a:latin typeface="Proxima Nova"/>
                 <a:cs typeface="Proxima Nova"/>
-                <a:hlinkClick r:id="rId6"/>
+                <a:hlinkClick r:id="rId7"/>
               </a:rPr>
               <a:t>Five Stages of Cloud Native [Video]</a:t>
             </a:r>
@@ -7783,7 +7827,7 @@
                 </a:solidFill>
                 <a:latin typeface="Proxima Nova"/>
                 <a:cs typeface="Proxima Nova"/>
-                <a:hlinkClick r:id="rId7"/>
+                <a:hlinkClick r:id="rId8"/>
               </a:rPr>
               <a:t>How Cloud Foundry is CI’d</a:t>
             </a:r>
@@ -7807,7 +7851,7 @@
                 </a:solidFill>
                 <a:latin typeface="Proxima Nova"/>
                 <a:cs typeface="Proxima Nova"/>
-                <a:hlinkClick r:id="rId8"/>
+                <a:hlinkClick r:id="rId9"/>
               </a:rPr>
               <a:t>Using Concourse to CD a Java app on PCF &amp; Azure</a:t>
             </a:r>

</xml_diff>